<commit_message>
Added sync methods. Updated md files.
</commit_message>
<xml_diff>
--- a/docs/Tatami overview.pptx
+++ b/docs/Tatami overview.pptx
@@ -10,8 +10,8 @@
     <p:sldId id="274" r:id="rId7"/>
     <p:sldId id="275" r:id="rId8"/>
     <p:sldId id="276" r:id="rId9"/>
-    <p:sldId id="268" r:id="rId10"/>
-    <p:sldId id="278" r:id="rId11"/>
+    <p:sldId id="279" r:id="rId10"/>
+    <p:sldId id="268" r:id="rId11"/>
     <p:sldId id="271" r:id="rId12"/>
     <p:sldId id="277" r:id="rId13"/>
     <p:sldId id="272" r:id="rId14"/>
@@ -257,7 +257,7 @@
           <a:p>
             <a:fld id="{81C161B3-4CDB-4656-B462-E496E5C8AC6A}" type="datetimeFigureOut">
               <a:rPr kumimoji="1" lang="ja-JP" altLang="en-US" smtClean="0"/>
-              <a:t>2014/8/12</a:t>
+              <a:t>2014/8/13</a:t>
             </a:fld>
             <a:endParaRPr kumimoji="1" lang="ja-JP" altLang="en-US"/>
           </a:p>
@@ -427,7 +427,7 @@
           <a:p>
             <a:fld id="{81C161B3-4CDB-4656-B462-E496E5C8AC6A}" type="datetimeFigureOut">
               <a:rPr kumimoji="1" lang="ja-JP" altLang="en-US" smtClean="0"/>
-              <a:t>2014/8/12</a:t>
+              <a:t>2014/8/13</a:t>
             </a:fld>
             <a:endParaRPr kumimoji="1" lang="ja-JP" altLang="en-US"/>
           </a:p>
@@ -607,7 +607,7 @@
           <a:p>
             <a:fld id="{81C161B3-4CDB-4656-B462-E496E5C8AC6A}" type="datetimeFigureOut">
               <a:rPr kumimoji="1" lang="ja-JP" altLang="en-US" smtClean="0"/>
-              <a:t>2014/8/12</a:t>
+              <a:t>2014/8/13</a:t>
             </a:fld>
             <a:endParaRPr kumimoji="1" lang="ja-JP" altLang="en-US"/>
           </a:p>
@@ -777,7 +777,7 @@
           <a:p>
             <a:fld id="{81C161B3-4CDB-4656-B462-E496E5C8AC6A}" type="datetimeFigureOut">
               <a:rPr kumimoji="1" lang="ja-JP" altLang="en-US" smtClean="0"/>
-              <a:t>2014/8/12</a:t>
+              <a:t>2014/8/13</a:t>
             </a:fld>
             <a:endParaRPr kumimoji="1" lang="ja-JP" altLang="en-US"/>
           </a:p>
@@ -1023,7 +1023,7 @@
           <a:p>
             <a:fld id="{81C161B3-4CDB-4656-B462-E496E5C8AC6A}" type="datetimeFigureOut">
               <a:rPr kumimoji="1" lang="ja-JP" altLang="en-US" smtClean="0"/>
-              <a:t>2014/8/12</a:t>
+              <a:t>2014/8/13</a:t>
             </a:fld>
             <a:endParaRPr kumimoji="1" lang="ja-JP" altLang="en-US"/>
           </a:p>
@@ -1255,7 +1255,7 @@
           <a:p>
             <a:fld id="{81C161B3-4CDB-4656-B462-E496E5C8AC6A}" type="datetimeFigureOut">
               <a:rPr kumimoji="1" lang="ja-JP" altLang="en-US" smtClean="0"/>
-              <a:t>2014/8/12</a:t>
+              <a:t>2014/8/13</a:t>
             </a:fld>
             <a:endParaRPr kumimoji="1" lang="ja-JP" altLang="en-US"/>
           </a:p>
@@ -1622,7 +1622,7 @@
           <a:p>
             <a:fld id="{81C161B3-4CDB-4656-B462-E496E5C8AC6A}" type="datetimeFigureOut">
               <a:rPr kumimoji="1" lang="ja-JP" altLang="en-US" smtClean="0"/>
-              <a:t>2014/8/12</a:t>
+              <a:t>2014/8/13</a:t>
             </a:fld>
             <a:endParaRPr kumimoji="1" lang="ja-JP" altLang="en-US"/>
           </a:p>
@@ -1740,7 +1740,7 @@
           <a:p>
             <a:fld id="{81C161B3-4CDB-4656-B462-E496E5C8AC6A}" type="datetimeFigureOut">
               <a:rPr kumimoji="1" lang="ja-JP" altLang="en-US" smtClean="0"/>
-              <a:t>2014/8/12</a:t>
+              <a:t>2014/8/13</a:t>
             </a:fld>
             <a:endParaRPr kumimoji="1" lang="ja-JP" altLang="en-US"/>
           </a:p>
@@ -1835,7 +1835,7 @@
           <a:p>
             <a:fld id="{81C161B3-4CDB-4656-B462-E496E5C8AC6A}" type="datetimeFigureOut">
               <a:rPr kumimoji="1" lang="ja-JP" altLang="en-US" smtClean="0"/>
-              <a:t>2014/8/12</a:t>
+              <a:t>2014/8/13</a:t>
             </a:fld>
             <a:endParaRPr kumimoji="1" lang="ja-JP" altLang="en-US"/>
           </a:p>
@@ -2112,7 +2112,7 @@
           <a:p>
             <a:fld id="{81C161B3-4CDB-4656-B462-E496E5C8AC6A}" type="datetimeFigureOut">
               <a:rPr kumimoji="1" lang="ja-JP" altLang="en-US" smtClean="0"/>
-              <a:t>2014/8/12</a:t>
+              <a:t>2014/8/13</a:t>
             </a:fld>
             <a:endParaRPr kumimoji="1" lang="ja-JP" altLang="en-US"/>
           </a:p>
@@ -2365,7 +2365,7 @@
           <a:p>
             <a:fld id="{81C161B3-4CDB-4656-B462-E496E5C8AC6A}" type="datetimeFigureOut">
               <a:rPr kumimoji="1" lang="ja-JP" altLang="en-US" smtClean="0"/>
-              <a:t>2014/8/12</a:t>
+              <a:t>2014/8/13</a:t>
             </a:fld>
             <a:endParaRPr kumimoji="1" lang="ja-JP" altLang="en-US"/>
           </a:p>
@@ -2578,7 +2578,7 @@
           <a:p>
             <a:fld id="{81C161B3-4CDB-4656-B462-E496E5C8AC6A}" type="datetimeFigureOut">
               <a:rPr kumimoji="1" lang="ja-JP" altLang="en-US" smtClean="0"/>
-              <a:t>2014/8/12</a:t>
+              <a:t>2014/8/13</a:t>
             </a:fld>
             <a:endParaRPr kumimoji="1" lang="ja-JP" altLang="en-US"/>
           </a:p>
@@ -3095,14 +3095,14 @@
             <p:ph idx="1"/>
             <p:extLst>
               <p:ext uri="{D42A27DB-BD31-4B8C-83A1-F6EECF244321}">
-                <p14:modId xmlns:p14="http://schemas.microsoft.com/office/powerpoint/2010/main" val="3211983012"/>
+                <p14:modId xmlns:p14="http://schemas.microsoft.com/office/powerpoint/2010/main" val="535710780"/>
               </p:ext>
             </p:extLst>
           </p:nvPr>
         </p:nvGraphicFramePr>
         <p:xfrm>
           <a:off x="82671" y="2092054"/>
-          <a:ext cx="11572501" cy="2590778"/>
+          <a:ext cx="11077742" cy="2590778"/>
         </p:xfrm>
         <a:graphic>
           <a:graphicData uri="http://schemas.openxmlformats.org/drawingml/2006/table">
@@ -3121,7 +3121,6 @@
                 <a:gridCol w="1032250"/>
                 <a:gridCol w="872696"/>
                 <a:gridCol w="570346"/>
-                <a:gridCol w="494759"/>
                 <a:gridCol w="751302"/>
                 <a:gridCol w="888731"/>
                 <a:gridCol w="625320"/>
@@ -3512,15 +3511,6 @@
                     <a:lstStyle/>
                     <a:p>
                       <a:pPr algn="l" fontAlgn="t"/>
-                      <a:r>
-                        <a:rPr lang="ja-JP" altLang="en-US" sz="1000" u="none" strike="noStrike" dirty="0">
-                          <a:solidFill>
-                            <a:schemeClr val="bg1"/>
-                          </a:solidFill>
-                          <a:effectLst/>
-                        </a:rPr>
-                        <a:t>　</a:t>
-                      </a:r>
                       <a:endParaRPr lang="ja-JP" altLang="en-US" sz="1000" b="0" i="0" u="none" strike="noStrike" dirty="0">
                         <a:solidFill>
                           <a:schemeClr val="bg1"/>
@@ -3534,6 +3524,72 @@
                   <a:tcPr marL="3230" marR="3230" marT="3230" marB="0">
                     <a:solidFill>
                       <a:srgbClr val="003366"/>
+                    </a:solidFill>
+                  </a:tcPr>
+                </a:tc>
+              </a:tr>
+              <a:tr h="723431">
+                <a:tc>
+                  <a:txBody>
+                    <a:bodyPr/>
+                    <a:lstStyle/>
+                    <a:p>
+                      <a:pPr algn="l" fontAlgn="t"/>
+                      <a:r>
+                        <a:rPr lang="ja-JP" altLang="en-US" sz="1000" u="none" strike="noStrike">
+                          <a:effectLst/>
+                        </a:rPr>
+                        <a:t>　</a:t>
+                      </a:r>
+                      <a:endParaRPr lang="ja-JP" altLang="en-US" sz="1000" b="0" i="0" u="none" strike="noStrike">
+                        <a:solidFill>
+                          <a:srgbClr val="000000"/>
+                        </a:solidFill>
+                        <a:effectLst/>
+                        <a:latin typeface="ＭＳ Ｐゴシック" panose="020B0600070205080204" pitchFamily="50" charset="-128"/>
+                        <a:ea typeface="ＭＳ Ｐゴシック" panose="020B0600070205080204" pitchFamily="50" charset="-128"/>
+                      </a:endParaRPr>
+                    </a:p>
+                  </a:txBody>
+                  <a:tcPr marL="3230" marR="3230" marT="3230" marB="0"/>
+                </a:tc>
+                <a:tc>
+                  <a:txBody>
+                    <a:bodyPr/>
+                    <a:lstStyle/>
+                    <a:p>
+                      <a:pPr algn="l" fontAlgn="t"/>
+                      <a:r>
+                        <a:rPr lang="en-US" sz="1000" u="none" strike="noStrike" dirty="0" err="1">
+                          <a:solidFill>
+                            <a:schemeClr val="bg1"/>
+                          </a:solidFill>
+                          <a:effectLst/>
+                        </a:rPr>
+                        <a:t>HttpRequest</a:t>
+                      </a:r>
+                      <a:r>
+                        <a:rPr lang="en-US" sz="1000" u="none" strike="noStrike" dirty="0">
+                          <a:solidFill>
+                            <a:schemeClr val="bg1"/>
+                          </a:solidFill>
+                          <a:effectLst/>
+                        </a:rPr>
+                        <a:t> Expected</a:t>
+                      </a:r>
+                      <a:endParaRPr lang="en-US" sz="1000" b="0" i="0" u="none" strike="noStrike" dirty="0">
+                        <a:solidFill>
+                          <a:schemeClr val="bg1"/>
+                        </a:solidFill>
+                        <a:effectLst/>
+                        <a:latin typeface="ＭＳ Ｐゴシック" panose="020B0600070205080204" pitchFamily="50" charset="-128"/>
+                        <a:ea typeface="ＭＳ Ｐゴシック" panose="020B0600070205080204" pitchFamily="50" charset="-128"/>
+                      </a:endParaRPr>
+                    </a:p>
+                  </a:txBody>
+                  <a:tcPr marL="3230" marR="3230" marT="3230" marB="0">
+                    <a:solidFill>
+                      <a:srgbClr val="006666"/>
                     </a:solidFill>
                   </a:tcPr>
                 </a:tc>
@@ -3555,72 +3611,6 @@
                   </a:txBody>
                   <a:tcPr marL="3230" marR="3230" marT="3230" marB="0">
                     <a:solidFill>
-                      <a:srgbClr val="003366"/>
-                    </a:solidFill>
-                  </a:tcPr>
-                </a:tc>
-              </a:tr>
-              <a:tr h="723431">
-                <a:tc>
-                  <a:txBody>
-                    <a:bodyPr/>
-                    <a:lstStyle/>
-                    <a:p>
-                      <a:pPr algn="l" fontAlgn="t"/>
-                      <a:r>
-                        <a:rPr lang="ja-JP" altLang="en-US" sz="1000" u="none" strike="noStrike">
-                          <a:effectLst/>
-                        </a:rPr>
-                        <a:t>　</a:t>
-                      </a:r>
-                      <a:endParaRPr lang="ja-JP" altLang="en-US" sz="1000" b="0" i="0" u="none" strike="noStrike">
-                        <a:solidFill>
-                          <a:srgbClr val="000000"/>
-                        </a:solidFill>
-                        <a:effectLst/>
-                        <a:latin typeface="ＭＳ Ｐゴシック" panose="020B0600070205080204" pitchFamily="50" charset="-128"/>
-                        <a:ea typeface="ＭＳ Ｐゴシック" panose="020B0600070205080204" pitchFamily="50" charset="-128"/>
-                      </a:endParaRPr>
-                    </a:p>
-                  </a:txBody>
-                  <a:tcPr marL="3230" marR="3230" marT="3230" marB="0"/>
-                </a:tc>
-                <a:tc>
-                  <a:txBody>
-                    <a:bodyPr/>
-                    <a:lstStyle/>
-                    <a:p>
-                      <a:pPr algn="l" fontAlgn="t"/>
-                      <a:r>
-                        <a:rPr lang="en-US" sz="1000" u="none" strike="noStrike" dirty="0" err="1">
-                          <a:solidFill>
-                            <a:schemeClr val="bg1"/>
-                          </a:solidFill>
-                          <a:effectLst/>
-                        </a:rPr>
-                        <a:t>HttpRequest</a:t>
-                      </a:r>
-                      <a:r>
-                        <a:rPr lang="en-US" sz="1000" u="none" strike="noStrike" dirty="0">
-                          <a:solidFill>
-                            <a:schemeClr val="bg1"/>
-                          </a:solidFill>
-                          <a:effectLst/>
-                        </a:rPr>
-                        <a:t> Expected</a:t>
-                      </a:r>
-                      <a:endParaRPr lang="en-US" sz="1000" b="0" i="0" u="none" strike="noStrike" dirty="0">
-                        <a:solidFill>
-                          <a:schemeClr val="bg1"/>
-                        </a:solidFill>
-                        <a:effectLst/>
-                        <a:latin typeface="ＭＳ Ｐゴシック" panose="020B0600070205080204" pitchFamily="50" charset="-128"/>
-                        <a:ea typeface="ＭＳ Ｐゴシック" panose="020B0600070205080204" pitchFamily="50" charset="-128"/>
-                      </a:endParaRPr>
-                    </a:p>
-                  </a:txBody>
-                  <a:tcPr marL="3230" marR="3230" marT="3230" marB="0">
-                    <a:solidFill>
                       <a:srgbClr val="006666"/>
                     </a:solidFill>
                   </a:tcPr>
@@ -3653,6 +3643,15 @@
                     <a:lstStyle/>
                     <a:p>
                       <a:pPr algn="l" fontAlgn="t"/>
+                      <a:r>
+                        <a:rPr lang="ja-JP" altLang="en-US" sz="1000" u="none" strike="noStrike" dirty="0">
+                          <a:solidFill>
+                            <a:schemeClr val="bg1"/>
+                          </a:solidFill>
+                          <a:effectLst/>
+                        </a:rPr>
+                        <a:t>　</a:t>
+                      </a:r>
                       <a:endParaRPr lang="ja-JP" altLang="en-US" sz="1000" b="0" i="0" u="none" strike="noStrike" dirty="0">
                         <a:solidFill>
                           <a:schemeClr val="bg1"/>
@@ -3676,6 +3675,77 @@
                     <a:p>
                       <a:pPr algn="l" fontAlgn="t"/>
                       <a:r>
+                        <a:rPr lang="en-US" sz="1000" u="none" strike="noStrike" dirty="0" err="1">
+                          <a:solidFill>
+                            <a:schemeClr val="bg1"/>
+                          </a:solidFill>
+                          <a:effectLst/>
+                        </a:rPr>
+                        <a:t>HttpRequest</a:t>
+                      </a:r>
+                      <a:r>
+                        <a:rPr lang="en-US" sz="1000" u="none" strike="noStrike" dirty="0">
+                          <a:solidFill>
+                            <a:schemeClr val="bg1"/>
+                          </a:solidFill>
+                          <a:effectLst/>
+                        </a:rPr>
+                        <a:t> Actual</a:t>
+                      </a:r>
+                      <a:endParaRPr lang="en-US" sz="1000" b="0" i="0" u="none" strike="noStrike" dirty="0">
+                        <a:solidFill>
+                          <a:schemeClr val="bg1"/>
+                        </a:solidFill>
+                        <a:effectLst/>
+                        <a:latin typeface="ＭＳ Ｐゴシック" panose="020B0600070205080204" pitchFamily="50" charset="-128"/>
+                        <a:ea typeface="ＭＳ Ｐゴシック" panose="020B0600070205080204" pitchFamily="50" charset="-128"/>
+                      </a:endParaRPr>
+                    </a:p>
+                  </a:txBody>
+                  <a:tcPr marL="3230" marR="3230" marT="3230" marB="0">
+                    <a:solidFill>
+                      <a:srgbClr val="006699"/>
+                    </a:solidFill>
+                  </a:tcPr>
+                </a:tc>
+                <a:tc>
+                  <a:txBody>
+                    <a:bodyPr/>
+                    <a:lstStyle/>
+                    <a:p>
+                      <a:pPr algn="l" fontAlgn="t"/>
+                      <a:r>
+                        <a:rPr lang="ja-JP" altLang="en-US" sz="1000" u="none" strike="noStrike">
+                          <a:solidFill>
+                            <a:schemeClr val="bg1"/>
+                          </a:solidFill>
+                          <a:effectLst/>
+                        </a:rPr>
+                        <a:t>　</a:t>
+                      </a:r>
+                      <a:endParaRPr lang="ja-JP" altLang="en-US" sz="1000" b="0" i="0" u="none" strike="noStrike">
+                        <a:solidFill>
+                          <a:schemeClr val="bg1"/>
+                        </a:solidFill>
+                        <a:effectLst/>
+                        <a:latin typeface="ＭＳ Ｐゴシック" panose="020B0600070205080204" pitchFamily="50" charset="-128"/>
+                        <a:ea typeface="ＭＳ Ｐゴシック" panose="020B0600070205080204" pitchFamily="50" charset="-128"/>
+                      </a:endParaRPr>
+                    </a:p>
+                  </a:txBody>
+                  <a:tcPr marL="3230" marR="3230" marT="3230" marB="0">
+                    <a:solidFill>
+                      <a:srgbClr val="006699"/>
+                    </a:solidFill>
+                  </a:tcPr>
+                </a:tc>
+                <a:tc>
+                  <a:txBody>
+                    <a:bodyPr/>
+                    <a:lstStyle/>
+                    <a:p>
+                      <a:pPr algn="l" fontAlgn="t"/>
+                      <a:r>
                         <a:rPr lang="ja-JP" altLang="en-US" sz="1000" u="none" strike="noStrike" dirty="0">
                           <a:solidFill>
                             <a:schemeClr val="bg1"/>
@@ -3696,46 +3766,6 @@
                   </a:txBody>
                   <a:tcPr marL="3230" marR="3230" marT="3230" marB="0">
                     <a:solidFill>
-                      <a:srgbClr val="006666"/>
-                    </a:solidFill>
-                  </a:tcPr>
-                </a:tc>
-                <a:tc>
-                  <a:txBody>
-                    <a:bodyPr/>
-                    <a:lstStyle/>
-                    <a:p>
-                      <a:pPr algn="l" fontAlgn="t"/>
-                      <a:r>
-                        <a:rPr lang="en-US" sz="1000" u="none" strike="noStrike" dirty="0" err="1">
-                          <a:solidFill>
-                            <a:schemeClr val="bg1"/>
-                          </a:solidFill>
-                          <a:effectLst/>
-                        </a:rPr>
-                        <a:t>HttpRequest</a:t>
-                      </a:r>
-                      <a:r>
-                        <a:rPr lang="en-US" sz="1000" u="none" strike="noStrike" dirty="0">
-                          <a:solidFill>
-                            <a:schemeClr val="bg1"/>
-                          </a:solidFill>
-                          <a:effectLst/>
-                        </a:rPr>
-                        <a:t> Actual</a:t>
-                      </a:r>
-                      <a:endParaRPr lang="en-US" sz="1000" b="0" i="0" u="none" strike="noStrike" dirty="0">
-                        <a:solidFill>
-                          <a:schemeClr val="bg1"/>
-                        </a:solidFill>
-                        <a:effectLst/>
-                        <a:latin typeface="ＭＳ Ｐゴシック" panose="020B0600070205080204" pitchFamily="50" charset="-128"/>
-                        <a:ea typeface="ＭＳ Ｐゴシック" panose="020B0600070205080204" pitchFamily="50" charset="-128"/>
-                      </a:endParaRPr>
-                    </a:p>
-                  </a:txBody>
-                  <a:tcPr marL="3230" marR="3230" marT="3230" marB="0">
-                    <a:solidFill>
                       <a:srgbClr val="006699"/>
                     </a:solidFill>
                   </a:tcPr>
@@ -3787,99 +3817,6 @@
                         <a:t>　</a:t>
                       </a:r>
                       <a:endParaRPr lang="ja-JP" altLang="en-US" sz="1000" b="0" i="0" u="none" strike="noStrike" dirty="0">
-                        <a:solidFill>
-                          <a:schemeClr val="bg1"/>
-                        </a:solidFill>
-                        <a:effectLst/>
-                        <a:latin typeface="ＭＳ Ｐゴシック" panose="020B0600070205080204" pitchFamily="50" charset="-128"/>
-                        <a:ea typeface="ＭＳ Ｐゴシック" panose="020B0600070205080204" pitchFamily="50" charset="-128"/>
-                      </a:endParaRPr>
-                    </a:p>
-                  </a:txBody>
-                  <a:tcPr marL="3230" marR="3230" marT="3230" marB="0">
-                    <a:solidFill>
-                      <a:srgbClr val="006699"/>
-                    </a:solidFill>
-                  </a:tcPr>
-                </a:tc>
-                <a:tc>
-                  <a:txBody>
-                    <a:bodyPr/>
-                    <a:lstStyle/>
-                    <a:p>
-                      <a:pPr algn="l" fontAlgn="t"/>
-                      <a:r>
-                        <a:rPr lang="ja-JP" altLang="en-US" sz="1000" u="none" strike="noStrike">
-                          <a:solidFill>
-                            <a:schemeClr val="bg1"/>
-                          </a:solidFill>
-                          <a:effectLst/>
-                        </a:rPr>
-                        <a:t>　</a:t>
-                      </a:r>
-                      <a:endParaRPr lang="ja-JP" altLang="en-US" sz="1000" b="0" i="0" u="none" strike="noStrike">
-                        <a:solidFill>
-                          <a:schemeClr val="bg1"/>
-                        </a:solidFill>
-                        <a:effectLst/>
-                        <a:latin typeface="ＭＳ Ｐゴシック" panose="020B0600070205080204" pitchFamily="50" charset="-128"/>
-                        <a:ea typeface="ＭＳ Ｐゴシック" panose="020B0600070205080204" pitchFamily="50" charset="-128"/>
-                      </a:endParaRPr>
-                    </a:p>
-                  </a:txBody>
-                  <a:tcPr marL="3230" marR="3230" marT="3230" marB="0">
-                    <a:solidFill>
-                      <a:srgbClr val="006699"/>
-                    </a:solidFill>
-                  </a:tcPr>
-                </a:tc>
-                <a:tc>
-                  <a:txBody>
-                    <a:bodyPr/>
-                    <a:lstStyle/>
-                    <a:p>
-                      <a:pPr algn="l" fontAlgn="t"/>
-                      <a:r>
-                        <a:rPr lang="ja-JP" altLang="en-US" sz="1000" u="none" strike="noStrike" dirty="0">
-                          <a:solidFill>
-                            <a:schemeClr val="bg1"/>
-                          </a:solidFill>
-                          <a:effectLst/>
-                        </a:rPr>
-                        <a:t>　</a:t>
-                      </a:r>
-                      <a:endParaRPr lang="ja-JP" altLang="en-US" sz="1000" b="0" i="0" u="none" strike="noStrike" dirty="0">
-                        <a:solidFill>
-                          <a:schemeClr val="bg1"/>
-                        </a:solidFill>
-                        <a:effectLst/>
-                        <a:latin typeface="ＭＳ Ｐゴシック" panose="020B0600070205080204" pitchFamily="50" charset="-128"/>
-                        <a:ea typeface="ＭＳ Ｐゴシック" panose="020B0600070205080204" pitchFamily="50" charset="-128"/>
-                      </a:endParaRPr>
-                    </a:p>
-                  </a:txBody>
-                  <a:tcPr marL="3230" marR="3230" marT="3230" marB="0">
-                    <a:solidFill>
-                      <a:srgbClr val="006699"/>
-                    </a:solidFill>
-                  </a:tcPr>
-                </a:tc>
-                <a:tc>
-                  <a:txBody>
-                    <a:bodyPr/>
-                    <a:lstStyle/>
-                    <a:p>
-                      <a:pPr algn="l" fontAlgn="t"/>
-                      <a:r>
-                        <a:rPr lang="ja-JP" altLang="en-US" sz="1000" u="none" strike="noStrike">
-                          <a:solidFill>
-                            <a:schemeClr val="bg1"/>
-                          </a:solidFill>
-                          <a:effectLst/>
-                        </a:rPr>
-                        <a:t>　</a:t>
-                      </a:r>
-                      <a:endParaRPr lang="ja-JP" altLang="en-US" sz="1000" b="0" i="0" u="none" strike="noStrike">
                         <a:solidFill>
                           <a:schemeClr val="bg1"/>
                         </a:solidFill>
@@ -4324,37 +4261,6 @@
                     <a:p>
                       <a:pPr algn="l" fontAlgn="t"/>
                       <a:r>
-                        <a:rPr lang="ja-JP" altLang="en-US" sz="1000" u="none" strike="noStrike" dirty="0">
-                          <a:solidFill>
-                            <a:schemeClr val="bg1"/>
-                          </a:solidFill>
-                          <a:effectLst/>
-                        </a:rPr>
-                        <a:t>　</a:t>
-                      </a:r>
-                      <a:endParaRPr lang="ja-JP" altLang="en-US" sz="1000" b="0" i="0" u="none" strike="noStrike" dirty="0">
-                        <a:solidFill>
-                          <a:schemeClr val="bg1"/>
-                        </a:solidFill>
-                        <a:effectLst/>
-                        <a:latin typeface="ＭＳ Ｐゴシック" panose="020B0600070205080204" pitchFamily="50" charset="-128"/>
-                        <a:ea typeface="ＭＳ Ｐゴシック" panose="020B0600070205080204" pitchFamily="50" charset="-128"/>
-                      </a:endParaRPr>
-                    </a:p>
-                  </a:txBody>
-                  <a:tcPr marL="3230" marR="3230" marT="3230" marB="0">
-                    <a:solidFill>
-                      <a:srgbClr val="0066FF"/>
-                    </a:solidFill>
-                  </a:tcPr>
-                </a:tc>
-                <a:tc>
-                  <a:txBody>
-                    <a:bodyPr/>
-                    <a:lstStyle/>
-                    <a:p>
-                      <a:pPr algn="l" fontAlgn="t"/>
-                      <a:r>
                         <a:rPr lang="en-US" sz="1000" u="none" strike="noStrike" dirty="0" err="1">
                           <a:solidFill>
                             <a:schemeClr val="bg1"/>
@@ -4725,37 +4631,6 @@
                   <a:tcPr marL="3230" marR="3230" marT="3230" marB="0">
                     <a:solidFill>
                       <a:srgbClr val="0099FF"/>
-                    </a:solidFill>
-                  </a:tcPr>
-                </a:tc>
-                <a:tc>
-                  <a:txBody>
-                    <a:bodyPr/>
-                    <a:lstStyle/>
-                    <a:p>
-                      <a:pPr algn="l" fontAlgn="t"/>
-                      <a:r>
-                        <a:rPr lang="ja-JP" altLang="en-US" sz="1000" u="none" strike="noStrike" dirty="0">
-                          <a:solidFill>
-                            <a:schemeClr val="bg1"/>
-                          </a:solidFill>
-                          <a:effectLst/>
-                        </a:rPr>
-                        <a:t>　</a:t>
-                      </a:r>
-                      <a:endParaRPr lang="ja-JP" altLang="en-US" sz="1000" b="0" i="0" u="none" strike="noStrike" dirty="0">
-                        <a:solidFill>
-                          <a:schemeClr val="bg1"/>
-                        </a:solidFill>
-                        <a:effectLst/>
-                        <a:latin typeface="ＭＳ Ｐゴシック" panose="020B0600070205080204" pitchFamily="50" charset="-128"/>
-                        <a:ea typeface="ＭＳ Ｐゴシック" panose="020B0600070205080204" pitchFamily="50" charset="-128"/>
-                      </a:endParaRPr>
-                    </a:p>
-                  </a:txBody>
-                  <a:tcPr marL="3230" marR="3230" marT="3230" marB="0">
-                    <a:solidFill>
-                      <a:srgbClr val="0066FF"/>
                     </a:solidFill>
                   </a:tcPr>
                 </a:tc>
@@ -5137,7 +5012,7 @@
           <p:nvPr>
             <p:extLst>
               <p:ext uri="{D42A27DB-BD31-4B8C-83A1-F6EECF244321}">
-                <p14:modId xmlns:p14="http://schemas.microsoft.com/office/powerpoint/2010/main" val="504093637"/>
+                <p14:modId xmlns:p14="http://schemas.microsoft.com/office/powerpoint/2010/main" val="1875562765"/>
               </p:ext>
             </p:extLst>
           </p:nvPr>
@@ -10970,7 +10845,7 @@
                         <a:defRPr/>
                       </a:pPr>
                       <a:r>
-                        <a:rPr kumimoji="1" lang="en-US" altLang="ja-JP" sz="1600" smtClean="0"/>
+                        <a:rPr kumimoji="1" lang="en-US" altLang="ja-JP" sz="1600" dirty="0" smtClean="0"/>
                         <a:t>None</a:t>
                       </a:r>
                       <a:endParaRPr kumimoji="1" lang="ja-JP" altLang="en-US" sz="1600" dirty="0"/>
@@ -13284,15 +13159,7 @@
           <a:p>
             <a:r>
               <a:rPr lang="en-US" altLang="ja-JP" dirty="0" smtClean="0"/>
-              <a:t>Tatami is a </a:t>
-            </a:r>
-            <a:r>
-              <a:rPr lang="en-US" altLang="ja-JP" dirty="0" smtClean="0"/>
-              <a:t>C# library </a:t>
-            </a:r>
-            <a:r>
-              <a:rPr lang="en-US" altLang="ja-JP" dirty="0" smtClean="0"/>
-              <a:t>to test a Web Application using </a:t>
+              <a:t>Tatami is a C# library to test a Web Application using </a:t>
             </a:r>
             <a:r>
               <a:rPr lang="en-US" altLang="ja-JP" dirty="0"/>
@@ -13467,11 +13334,7 @@
           <a:p>
             <a:r>
               <a:rPr kumimoji="1" lang="en-US" altLang="ja-JP" sz="4000" dirty="0" smtClean="0"/>
-              <a:t>Test </a:t>
-            </a:r>
-            <a:r>
-              <a:rPr kumimoji="1" lang="en-US" altLang="ja-JP" sz="4000" dirty="0" smtClean="0"/>
-              <a:t>a </a:t>
+              <a:t>Test a </a:t>
             </a:r>
             <a:r>
               <a:rPr lang="en-US" altLang="ja-JP" sz="4000" dirty="0"/>
@@ -13521,11 +13384,7 @@
             </a:pPr>
             <a:r>
               <a:rPr lang="en-US" altLang="ja-JP" sz="2000" dirty="0" smtClean="0"/>
-              <a:t>Gets </a:t>
-            </a:r>
-            <a:r>
-              <a:rPr lang="en-US" altLang="ja-JP" sz="2000" dirty="0" smtClean="0"/>
-              <a:t>a actual </a:t>
+              <a:t>Gets a actual </a:t>
             </a:r>
             <a:r>
               <a:rPr lang="en-US" altLang="ja-JP" sz="2000" dirty="0"/>
@@ -13533,11 +13392,7 @@
             </a:r>
             <a:r>
               <a:rPr lang="en-US" altLang="ja-JP" sz="2000" dirty="0" smtClean="0"/>
-              <a:t>ocument from </a:t>
-            </a:r>
-            <a:r>
-              <a:rPr lang="en-US" altLang="ja-JP" sz="2000" dirty="0" smtClean="0"/>
-              <a:t>web </a:t>
+              <a:t>ocument from web </a:t>
             </a:r>
             <a:r>
               <a:rPr lang="en-US" altLang="ja-JP" sz="2000" dirty="0"/>
@@ -13545,11 +13400,7 @@
             </a:r>
             <a:r>
               <a:rPr lang="en-US" altLang="ja-JP" sz="2000" dirty="0" smtClean="0"/>
-              <a:t>pplication </a:t>
-            </a:r>
-            <a:r>
-              <a:rPr lang="en-US" altLang="ja-JP" sz="2000" dirty="0" smtClean="0"/>
-              <a:t>(Wikipedia).</a:t>
+              <a:t>pplication (Wikipedia).</a:t>
             </a:r>
           </a:p>
           <a:p>
@@ -13644,7 +13495,6 @@
               <a:rPr kumimoji="1" lang="en-US" altLang="ja-JP" dirty="0" smtClean="0"/>
               <a:t>(Wikipedia)</a:t>
             </a:r>
-            <a:endParaRPr kumimoji="1" lang="en-US" altLang="ja-JP" dirty="0" smtClean="0"/>
           </a:p>
         </p:txBody>
       </p:sp>
@@ -14125,19 +13975,7 @@
             </a:pPr>
             <a:r>
               <a:rPr lang="en-US" altLang="ja-JP" sz="2000" dirty="0" smtClean="0"/>
-              <a:t>Gets a expected </a:t>
-            </a:r>
-            <a:r>
-              <a:rPr lang="en-US" altLang="ja-JP" sz="2000" dirty="0" smtClean="0"/>
-              <a:t>document from </a:t>
-            </a:r>
-            <a:r>
-              <a:rPr lang="en-US" altLang="ja-JP" sz="2000" dirty="0" smtClean="0"/>
-              <a:t>web </a:t>
-            </a:r>
-            <a:r>
-              <a:rPr lang="en-US" altLang="ja-JP" sz="2000" dirty="0" smtClean="0"/>
-              <a:t>service (Yahoo RSS).</a:t>
+              <a:t>Gets a expected document from web service (Yahoo RSS).</a:t>
             </a:r>
           </a:p>
           <a:p>
@@ -14179,19 +14017,11 @@
             </a:r>
             <a:r>
               <a:rPr lang="en-US" altLang="ja-JP" sz="2000" dirty="0"/>
-              <a:t>document from </a:t>
-            </a:r>
-            <a:r>
-              <a:rPr lang="en-US" altLang="ja-JP" sz="2000" dirty="0"/>
-              <a:t>w</a:t>
+              <a:t>document from w</a:t>
             </a:r>
             <a:r>
               <a:rPr lang="en-US" altLang="ja-JP" sz="2000" dirty="0" smtClean="0"/>
-              <a:t>eb </a:t>
-            </a:r>
-            <a:r>
-              <a:rPr lang="en-US" altLang="ja-JP" sz="2000" dirty="0" smtClean="0"/>
-              <a:t>application (Yahoo Weather).</a:t>
+              <a:t>eb application (Yahoo Weather).</a:t>
             </a:r>
           </a:p>
           <a:p>
@@ -14223,11 +14053,7 @@
             </a:pPr>
             <a:r>
               <a:rPr lang="en-US" altLang="ja-JP" sz="2000" dirty="0" smtClean="0"/>
-              <a:t>Asserts </a:t>
-            </a:r>
-            <a:r>
-              <a:rPr lang="en-US" altLang="ja-JP" sz="2000" dirty="0" smtClean="0"/>
-              <a:t>HTTP response header and/or document values using expected values in </a:t>
+              <a:t>Asserts HTTP response header and/or document values using expected values in </a:t>
             </a:r>
             <a:r>
               <a:rPr lang="en-US" altLang="ja-JP" sz="2000" dirty="0"/>
@@ -14235,11 +14061,7 @@
             </a:r>
             <a:r>
               <a:rPr lang="en-US" altLang="ja-JP" sz="2000" dirty="0" smtClean="0"/>
-              <a:t>eb service </a:t>
-            </a:r>
-            <a:r>
-              <a:rPr lang="en-US" altLang="ja-JP" sz="2000" dirty="0" smtClean="0"/>
-              <a:t>or CSV file</a:t>
+              <a:t>eb service or CSV file</a:t>
             </a:r>
             <a:r>
               <a:rPr kumimoji="1" lang="en-US" altLang="ja-JP" sz="2000" dirty="0" smtClean="0"/>
@@ -14935,33 +14757,298 @@
           <a:lstStyle/>
           <a:p>
             <a:r>
-              <a:rPr kumimoji="1" lang="en-US" altLang="ja-JP" dirty="0" smtClean="0"/>
-              <a:t>Sample Implementation</a:t>
-            </a:r>
-            <a:endParaRPr kumimoji="1" lang="ja-JP" altLang="en-US" dirty="0"/>
+              <a:rPr kumimoji="1" lang="en-US" altLang="ja-JP" sz="3600" dirty="0" smtClean="0"/>
+              <a:t>Test a </a:t>
+            </a:r>
+            <a:r>
+              <a:rPr kumimoji="1" lang="en-US" altLang="ja-JP" sz="3600" dirty="0" smtClean="0"/>
+              <a:t>JSON from Web API</a:t>
+            </a:r>
+            <a:r>
+              <a:rPr lang="en-US" altLang="ja-JP" sz="3600" dirty="0" smtClean="0"/>
+              <a:t> </a:t>
+            </a:r>
+            <a:r>
+              <a:rPr lang="en-US" altLang="ja-JP" sz="3600" dirty="0" smtClean="0"/>
+              <a:t>using static expected values</a:t>
+            </a:r>
+            <a:endParaRPr kumimoji="1" lang="ja-JP" altLang="en-US" sz="3600" dirty="0"/>
           </a:p>
         </p:txBody>
       </p:sp>
       <p:sp>
         <p:nvSpPr>
-          <p:cNvPr id="4" name="TextBox 3"/>
+          <p:cNvPr id="3" name="Content Placeholder 2"/>
+          <p:cNvSpPr>
+            <a:spLocks noGrp="1"/>
+          </p:cNvSpPr>
+          <p:nvPr>
+            <p:ph idx="1"/>
+          </p:nvPr>
+        </p:nvSpPr>
+        <p:spPr>
+          <a:xfrm>
+            <a:off x="838200" y="1690689"/>
+            <a:ext cx="10515600" cy="4486274"/>
+          </a:xfrm>
+        </p:spPr>
+        <p:txBody>
+          <a:bodyPr>
+            <a:normAutofit/>
+          </a:bodyPr>
+          <a:lstStyle/>
+          <a:p>
+            <a:pPr marL="514350" indent="-514350">
+              <a:buFont typeface="+mj-lt"/>
+              <a:buAutoNum type="arabicPeriod"/>
+            </a:pPr>
+            <a:r>
+              <a:rPr lang="en-US" altLang="ja-JP" sz="2000" dirty="0" smtClean="0"/>
+              <a:t>Gets a </a:t>
+            </a:r>
+            <a:r>
+              <a:rPr lang="en-US" altLang="ja-JP" sz="2000" dirty="0" smtClean="0"/>
+              <a:t>JSON from </a:t>
+            </a:r>
+            <a:r>
+              <a:rPr lang="en-US" altLang="ja-JP" sz="2000" dirty="0"/>
+              <a:t>W</a:t>
+            </a:r>
+            <a:r>
+              <a:rPr lang="en-US" altLang="ja-JP" sz="2000" dirty="0" smtClean="0"/>
+              <a:t>eb API (Yahoo API).</a:t>
+            </a:r>
+            <a:endParaRPr lang="en-US" altLang="ja-JP" sz="2000" dirty="0" smtClean="0"/>
+          </a:p>
+          <a:p>
+            <a:pPr marL="457200" lvl="1" indent="0">
+              <a:buNone/>
+            </a:pPr>
+            <a:r>
+              <a:rPr lang="en-US" sz="1600" dirty="0" smtClean="0"/>
+              <a:t>	</a:t>
+            </a:r>
+            <a:r>
+              <a:rPr lang="en-US" sz="1600" dirty="0">
+                <a:hlinkClick r:id="rId2"/>
+              </a:rPr>
+              <a:t>http://query.yahooapis.com/v1/public/yql?q=select%20*%20from%20weather.forecast%20where%20woeid=%222459115%22and%20u=%</a:t>
+            </a:r>
+            <a:r>
+              <a:rPr lang="en-US" sz="1600" dirty="0" smtClean="0">
+                <a:hlinkClick r:id="rId2"/>
+              </a:rPr>
+              <a:t>22f%22&amp;format=json</a:t>
+            </a:r>
+            <a:endParaRPr lang="en-US" altLang="ja-JP" sz="1600" dirty="0" smtClean="0"/>
+          </a:p>
+          <a:p>
+            <a:pPr marL="514350" indent="-514350">
+              <a:buFont typeface="+mj-lt"/>
+              <a:buAutoNum type="arabicPeriod"/>
+            </a:pPr>
+            <a:r>
+              <a:rPr lang="en-US" altLang="ja-JP" sz="2000" dirty="0" smtClean="0"/>
+              <a:t>Asserts HTTP response header and/or document values using expected values in </a:t>
+            </a:r>
+            <a:r>
+              <a:rPr kumimoji="1" lang="en-US" altLang="ja-JP" sz="2000" dirty="0" smtClean="0"/>
+              <a:t>CSV file.</a:t>
+            </a:r>
+            <a:endParaRPr lang="en-US" altLang="ja-JP" sz="2000" dirty="0" smtClean="0"/>
+          </a:p>
+        </p:txBody>
+      </p:sp>
+      <p:sp>
+        <p:nvSpPr>
+          <p:cNvPr id="5" name="Rounded Rectangle 4"/>
+          <p:cNvSpPr/>
+          <p:nvPr/>
+        </p:nvSpPr>
+        <p:spPr>
+          <a:xfrm>
+            <a:off x="7483931" y="4233494"/>
+            <a:ext cx="1861073" cy="1108038"/>
+          </a:xfrm>
+          <a:prstGeom prst="roundRect">
+            <a:avLst/>
+          </a:prstGeom>
+        </p:spPr>
+        <p:style>
+          <a:lnRef idx="2">
+            <a:schemeClr val="accent5">
+              <a:shade val="50000"/>
+            </a:schemeClr>
+          </a:lnRef>
+          <a:fillRef idx="1">
+            <a:schemeClr val="accent5"/>
+          </a:fillRef>
+          <a:effectRef idx="0">
+            <a:schemeClr val="accent5"/>
+          </a:effectRef>
+          <a:fontRef idx="minor">
+            <a:schemeClr val="lt1"/>
+          </a:fontRef>
+        </p:style>
+        <p:txBody>
+          <a:bodyPr rtlCol="0" anchor="ctr"/>
+          <a:lstStyle/>
+          <a:p>
+            <a:pPr algn="ctr"/>
+            <a:r>
+              <a:rPr kumimoji="1" lang="en-US" altLang="ja-JP" dirty="0" smtClean="0"/>
+              <a:t>Web </a:t>
+            </a:r>
+            <a:r>
+              <a:rPr kumimoji="1" lang="en-US" altLang="ja-JP" dirty="0" smtClean="0"/>
+              <a:t>API</a:t>
+            </a:r>
+            <a:endParaRPr kumimoji="1" lang="en-US" altLang="ja-JP" dirty="0" smtClean="0"/>
+          </a:p>
+          <a:p>
+            <a:pPr algn="ctr"/>
+            <a:r>
+              <a:rPr kumimoji="1" lang="en-US" altLang="ja-JP" dirty="0" smtClean="0"/>
+              <a:t>(Yahoo API)</a:t>
+            </a:r>
+            <a:endParaRPr kumimoji="1" lang="en-US" altLang="ja-JP" dirty="0" smtClean="0"/>
+          </a:p>
+        </p:txBody>
+      </p:sp>
+      <p:sp>
+        <p:nvSpPr>
+          <p:cNvPr id="6" name="Rectangle 5"/>
+          <p:cNvSpPr/>
+          <p:nvPr/>
+        </p:nvSpPr>
+        <p:spPr>
+          <a:xfrm>
+            <a:off x="3535874" y="4351828"/>
+            <a:ext cx="1065007" cy="871370"/>
+          </a:xfrm>
+          <a:prstGeom prst="rect">
+            <a:avLst/>
+          </a:prstGeom>
+        </p:spPr>
+        <p:style>
+          <a:lnRef idx="2">
+            <a:schemeClr val="dk1"/>
+          </a:lnRef>
+          <a:fillRef idx="1">
+            <a:schemeClr val="lt1"/>
+          </a:fillRef>
+          <a:effectRef idx="0">
+            <a:schemeClr val="dk1"/>
+          </a:effectRef>
+          <a:fontRef idx="minor">
+            <a:schemeClr val="dk1"/>
+          </a:fontRef>
+        </p:style>
+        <p:txBody>
+          <a:bodyPr rtlCol="0" anchor="ctr"/>
+          <a:lstStyle/>
+          <a:p>
+            <a:pPr algn="ctr"/>
+            <a:r>
+              <a:rPr kumimoji="1" lang="en-US" altLang="ja-JP" dirty="0" smtClean="0"/>
+              <a:t>Test Client</a:t>
+            </a:r>
+            <a:endParaRPr kumimoji="1" lang="ja-JP" altLang="en-US" dirty="0"/>
+          </a:p>
+        </p:txBody>
+      </p:sp>
+      <p:sp>
+        <p:nvSpPr>
+          <p:cNvPr id="8" name="Rectangle 7"/>
+          <p:cNvSpPr/>
+          <p:nvPr/>
+        </p:nvSpPr>
+        <p:spPr>
+          <a:xfrm>
+            <a:off x="2766702" y="3993903"/>
+            <a:ext cx="1048871" cy="580913"/>
+          </a:xfrm>
+          <a:prstGeom prst="rect">
+            <a:avLst/>
+          </a:prstGeom>
+        </p:spPr>
+        <p:style>
+          <a:lnRef idx="2">
+            <a:schemeClr val="accent4">
+              <a:shade val="50000"/>
+            </a:schemeClr>
+          </a:lnRef>
+          <a:fillRef idx="1">
+            <a:schemeClr val="accent4"/>
+          </a:fillRef>
+          <a:effectRef idx="0">
+            <a:schemeClr val="accent4"/>
+          </a:effectRef>
+          <a:fontRef idx="minor">
+            <a:schemeClr val="lt1"/>
+          </a:fontRef>
+        </p:style>
+        <p:txBody>
+          <a:bodyPr rtlCol="0" anchor="ctr"/>
+          <a:lstStyle/>
+          <a:p>
+            <a:pPr algn="ctr"/>
+            <a:r>
+              <a:rPr kumimoji="1" lang="en-US" altLang="ja-JP" sz="1200" dirty="0" smtClean="0"/>
+              <a:t>Tatami.dll</a:t>
+            </a:r>
+            <a:endParaRPr kumimoji="1" lang="ja-JP" altLang="en-US" sz="1200" dirty="0"/>
+          </a:p>
+        </p:txBody>
+      </p:sp>
+      <p:cxnSp>
+        <p:nvCxnSpPr>
+          <p:cNvPr id="10" name="Straight Arrow Connector 9"/>
+          <p:cNvCxnSpPr/>
+          <p:nvPr/>
+        </p:nvCxnSpPr>
+        <p:spPr>
+          <a:xfrm>
+            <a:off x="4853686" y="4588169"/>
+            <a:ext cx="2377440" cy="0"/>
+          </a:xfrm>
+          <a:prstGeom prst="straightConnector1">
+            <a:avLst/>
+          </a:prstGeom>
+          <a:ln>
+            <a:tailEnd type="triangle"/>
+          </a:ln>
+        </p:spPr>
+        <p:style>
+          <a:lnRef idx="2">
+            <a:schemeClr val="dk1"/>
+          </a:lnRef>
+          <a:fillRef idx="0">
+            <a:schemeClr val="dk1"/>
+          </a:fillRef>
+          <a:effectRef idx="1">
+            <a:schemeClr val="dk1"/>
+          </a:effectRef>
+          <a:fontRef idx="minor">
+            <a:schemeClr val="tx1"/>
+          </a:fontRef>
+        </p:style>
+      </p:cxnSp>
+      <p:sp>
+        <p:nvSpPr>
+          <p:cNvPr id="11" name="TextBox 10"/>
           <p:cNvSpPr txBox="1"/>
           <p:nvPr/>
         </p:nvSpPr>
         <p:spPr>
           <a:xfrm>
-            <a:off x="247934" y="1949996"/>
-            <a:ext cx="11696131" cy="4278094"/>
+            <a:off x="5181794" y="4265271"/>
+            <a:ext cx="1871831" cy="276999"/>
           </a:xfrm>
           <a:prstGeom prst="rect">
             <a:avLst/>
           </a:prstGeom>
           <a:noFill/>
-          <a:ln>
-            <a:solidFill>
-              <a:schemeClr val="tx1"/>
-            </a:solidFill>
-          </a:ln>
         </p:spPr>
         <p:txBody>
           <a:bodyPr wrap="square" rtlCol="0">
@@ -14969,456 +15056,267 @@
           </a:bodyPr>
           <a:lstStyle/>
           <a:p>
-            <a:r>
-              <a:rPr lang="en-US" altLang="ja-JP" sz="1600" dirty="0">
-                <a:latin typeface="Consolas" panose="020B0609020204030204" pitchFamily="49" charset="0"/>
-                <a:cs typeface="Consolas" panose="020B0609020204030204" pitchFamily="49" charset="0"/>
-              </a:rPr>
-              <a:t>[</a:t>
-            </a:r>
-            <a:r>
-              <a:rPr lang="en-US" altLang="ja-JP" sz="1600" dirty="0" err="1">
-                <a:latin typeface="Consolas" panose="020B0609020204030204" pitchFamily="49" charset="0"/>
-                <a:cs typeface="Consolas" panose="020B0609020204030204" pitchFamily="49" charset="0"/>
-              </a:rPr>
-              <a:t>TestMethod</a:t>
-            </a:r>
-            <a:r>
-              <a:rPr lang="en-US" altLang="ja-JP" sz="1600" dirty="0">
-                <a:latin typeface="Consolas" panose="020B0609020204030204" pitchFamily="49" charset="0"/>
-                <a:cs typeface="Consolas" panose="020B0609020204030204" pitchFamily="49" charset="0"/>
-              </a:rPr>
-              <a:t>]</a:t>
-            </a:r>
-          </a:p>
-          <a:p>
-            <a:r>
-              <a:rPr lang="en-US" altLang="ja-JP" sz="1600" dirty="0">
-                <a:latin typeface="Consolas" panose="020B0609020204030204" pitchFamily="49" charset="0"/>
-                <a:cs typeface="Consolas" panose="020B0609020204030204" pitchFamily="49" charset="0"/>
-              </a:rPr>
-              <a:t>public </a:t>
-            </a:r>
-            <a:r>
-              <a:rPr lang="en-US" altLang="ja-JP" sz="1600" dirty="0" err="1">
-                <a:latin typeface="Consolas" panose="020B0609020204030204" pitchFamily="49" charset="0"/>
-                <a:cs typeface="Consolas" panose="020B0609020204030204" pitchFamily="49" charset="0"/>
-              </a:rPr>
-              <a:t>async</a:t>
-            </a:r>
-            <a:r>
-              <a:rPr lang="en-US" altLang="ja-JP" sz="1600" dirty="0">
-                <a:latin typeface="Consolas" panose="020B0609020204030204" pitchFamily="49" charset="0"/>
-                <a:cs typeface="Consolas" panose="020B0609020204030204" pitchFamily="49" charset="0"/>
-              </a:rPr>
-              <a:t> Task </a:t>
-            </a:r>
-            <a:r>
-              <a:rPr lang="en-US" altLang="ja-JP" sz="1600" dirty="0" err="1">
-                <a:latin typeface="Consolas" panose="020B0609020204030204" pitchFamily="49" charset="0"/>
-                <a:cs typeface="Consolas" panose="020B0609020204030204" pitchFamily="49" charset="0"/>
-              </a:rPr>
-              <a:t>TestWikipediaWithUnitedStatesPage</a:t>
-            </a:r>
-            <a:r>
-              <a:rPr lang="en-US" altLang="ja-JP" sz="1600" dirty="0">
-                <a:latin typeface="Consolas" panose="020B0609020204030204" pitchFamily="49" charset="0"/>
-                <a:cs typeface="Consolas" panose="020B0609020204030204" pitchFamily="49" charset="0"/>
-              </a:rPr>
-              <a:t>()</a:t>
-            </a:r>
-          </a:p>
-          <a:p>
-            <a:r>
-              <a:rPr lang="en-US" altLang="ja-JP" sz="1600" dirty="0">
-                <a:latin typeface="Consolas" panose="020B0609020204030204" pitchFamily="49" charset="0"/>
-                <a:cs typeface="Consolas" panose="020B0609020204030204" pitchFamily="49" charset="0"/>
-              </a:rPr>
-              <a:t>{</a:t>
-            </a:r>
-          </a:p>
-          <a:p>
-            <a:r>
-              <a:rPr lang="en-US" altLang="ja-JP" sz="1600" dirty="0">
-                <a:latin typeface="Consolas" panose="020B0609020204030204" pitchFamily="49" charset="0"/>
-                <a:cs typeface="Consolas" panose="020B0609020204030204" pitchFamily="49" charset="0"/>
-              </a:rPr>
-              <a:t>    // Arrange</a:t>
-            </a:r>
-          </a:p>
-          <a:p>
-            <a:r>
-              <a:rPr lang="en-US" altLang="ja-JP" sz="1600" dirty="0">
-                <a:latin typeface="Consolas" panose="020B0609020204030204" pitchFamily="49" charset="0"/>
-                <a:cs typeface="Consolas" panose="020B0609020204030204" pitchFamily="49" charset="0"/>
-              </a:rPr>
-              <a:t>    </a:t>
-            </a:r>
-            <a:r>
-              <a:rPr lang="en-US" altLang="ja-JP" sz="1600" dirty="0" err="1">
-                <a:latin typeface="Consolas" panose="020B0609020204030204" pitchFamily="49" charset="0"/>
-                <a:cs typeface="Consolas" panose="020B0609020204030204" pitchFamily="49" charset="0"/>
-              </a:rPr>
-              <a:t>var</a:t>
-            </a:r>
-            <a:r>
-              <a:rPr lang="en-US" altLang="ja-JP" sz="1600" dirty="0">
-                <a:latin typeface="Consolas" panose="020B0609020204030204" pitchFamily="49" charset="0"/>
-                <a:cs typeface="Consolas" panose="020B0609020204030204" pitchFamily="49" charset="0"/>
-              </a:rPr>
-              <a:t> </a:t>
-            </a:r>
-            <a:r>
-              <a:rPr lang="en-US" altLang="ja-JP" sz="1600" dirty="0" err="1">
-                <a:latin typeface="Consolas" panose="020B0609020204030204" pitchFamily="49" charset="0"/>
-                <a:cs typeface="Consolas" panose="020B0609020204030204" pitchFamily="49" charset="0"/>
-              </a:rPr>
-              <a:t>testCasesCsv</a:t>
-            </a:r>
-            <a:r>
-              <a:rPr lang="en-US" altLang="ja-JP" sz="1600" dirty="0">
-                <a:latin typeface="Consolas" panose="020B0609020204030204" pitchFamily="49" charset="0"/>
-                <a:cs typeface="Consolas" panose="020B0609020204030204" pitchFamily="49" charset="0"/>
-              </a:rPr>
-              <a:t> = </a:t>
-            </a:r>
-            <a:r>
-              <a:rPr lang="en-US" altLang="ja-JP" sz="1600" dirty="0" err="1">
-                <a:latin typeface="Consolas" panose="020B0609020204030204" pitchFamily="49" charset="0"/>
-                <a:cs typeface="Consolas" panose="020B0609020204030204" pitchFamily="49" charset="0"/>
-              </a:rPr>
-              <a:t>File.ReadAllText</a:t>
-            </a:r>
-            <a:r>
-              <a:rPr lang="en-US" altLang="ja-JP" sz="1600" dirty="0">
-                <a:latin typeface="Consolas" panose="020B0609020204030204" pitchFamily="49" charset="0"/>
-                <a:cs typeface="Consolas" panose="020B0609020204030204" pitchFamily="49" charset="0"/>
-              </a:rPr>
-              <a:t>(@"Wikipedia\Resources\Test_United_States.csv");</a:t>
-            </a:r>
-          </a:p>
-          <a:p>
-            <a:r>
-              <a:rPr lang="en-US" altLang="ja-JP" sz="1600" dirty="0">
-                <a:latin typeface="Consolas" panose="020B0609020204030204" pitchFamily="49" charset="0"/>
-                <a:cs typeface="Consolas" panose="020B0609020204030204" pitchFamily="49" charset="0"/>
-              </a:rPr>
-              <a:t>    </a:t>
-            </a:r>
-            <a:r>
-              <a:rPr lang="en-US" altLang="ja-JP" sz="1600" dirty="0" err="1">
-                <a:latin typeface="Consolas" panose="020B0609020204030204" pitchFamily="49" charset="0"/>
-                <a:cs typeface="Consolas" panose="020B0609020204030204" pitchFamily="49" charset="0"/>
-              </a:rPr>
-              <a:t>var</a:t>
-            </a:r>
-            <a:r>
-              <a:rPr lang="en-US" altLang="ja-JP" sz="1600" dirty="0">
-                <a:latin typeface="Consolas" panose="020B0609020204030204" pitchFamily="49" charset="0"/>
-                <a:cs typeface="Consolas" panose="020B0609020204030204" pitchFamily="49" charset="0"/>
-              </a:rPr>
-              <a:t> </a:t>
-            </a:r>
-            <a:r>
-              <a:rPr lang="en-US" altLang="ja-JP" sz="1600" dirty="0" err="1">
-                <a:latin typeface="Consolas" panose="020B0609020204030204" pitchFamily="49" charset="0"/>
-                <a:cs typeface="Consolas" panose="020B0609020204030204" pitchFamily="49" charset="0"/>
-              </a:rPr>
-              <a:t>baseUriMappingXml</a:t>
-            </a:r>
-            <a:r>
-              <a:rPr lang="en-US" altLang="ja-JP" sz="1600" dirty="0">
-                <a:latin typeface="Consolas" panose="020B0609020204030204" pitchFamily="49" charset="0"/>
-                <a:cs typeface="Consolas" panose="020B0609020204030204" pitchFamily="49" charset="0"/>
-              </a:rPr>
-              <a:t> = </a:t>
-            </a:r>
-            <a:r>
-              <a:rPr lang="en-US" altLang="ja-JP" sz="1600" dirty="0" err="1">
-                <a:latin typeface="Consolas" panose="020B0609020204030204" pitchFamily="49" charset="0"/>
-                <a:cs typeface="Consolas" panose="020B0609020204030204" pitchFamily="49" charset="0"/>
-              </a:rPr>
-              <a:t>File.ReadAllText</a:t>
-            </a:r>
-            <a:r>
-              <a:rPr lang="en-US" altLang="ja-JP" sz="1600" dirty="0">
-                <a:latin typeface="Consolas" panose="020B0609020204030204" pitchFamily="49" charset="0"/>
-                <a:cs typeface="Consolas" panose="020B0609020204030204" pitchFamily="49" charset="0"/>
-              </a:rPr>
-              <a:t>(@"Wikipedia\Resources\BaseUriMapping.xml");</a:t>
-            </a:r>
-          </a:p>
-          <a:p>
-            <a:r>
-              <a:rPr lang="en-US" altLang="ja-JP" sz="1600" dirty="0">
-                <a:latin typeface="Consolas" panose="020B0609020204030204" pitchFamily="49" charset="0"/>
-                <a:cs typeface="Consolas" panose="020B0609020204030204" pitchFamily="49" charset="0"/>
-              </a:rPr>
-              <a:t>    </a:t>
-            </a:r>
-            <a:r>
-              <a:rPr lang="en-US" altLang="ja-JP" sz="1600" dirty="0" err="1">
-                <a:latin typeface="Consolas" panose="020B0609020204030204" pitchFamily="49" charset="0"/>
-                <a:cs typeface="Consolas" panose="020B0609020204030204" pitchFamily="49" charset="0"/>
-              </a:rPr>
-              <a:t>var</a:t>
-            </a:r>
-            <a:r>
-              <a:rPr lang="en-US" altLang="ja-JP" sz="1600" dirty="0">
-                <a:latin typeface="Consolas" panose="020B0609020204030204" pitchFamily="49" charset="0"/>
-                <a:cs typeface="Consolas" panose="020B0609020204030204" pitchFamily="49" charset="0"/>
-              </a:rPr>
-              <a:t> </a:t>
-            </a:r>
-            <a:r>
-              <a:rPr lang="en-US" altLang="ja-JP" sz="1600" dirty="0" err="1">
-                <a:latin typeface="Consolas" panose="020B0609020204030204" pitchFamily="49" charset="0"/>
-                <a:cs typeface="Consolas" panose="020B0609020204030204" pitchFamily="49" charset="0"/>
-              </a:rPr>
-              <a:t>userAgentMappingXml</a:t>
-            </a:r>
-            <a:r>
-              <a:rPr lang="en-US" altLang="ja-JP" sz="1600" dirty="0">
-                <a:latin typeface="Consolas" panose="020B0609020204030204" pitchFamily="49" charset="0"/>
-                <a:cs typeface="Consolas" panose="020B0609020204030204" pitchFamily="49" charset="0"/>
-              </a:rPr>
-              <a:t> = </a:t>
-            </a:r>
-            <a:r>
-              <a:rPr lang="en-US" altLang="ja-JP" sz="1600" dirty="0" err="1">
-                <a:latin typeface="Consolas" panose="020B0609020204030204" pitchFamily="49" charset="0"/>
-                <a:cs typeface="Consolas" panose="020B0609020204030204" pitchFamily="49" charset="0"/>
-              </a:rPr>
-              <a:t>File.ReadAllText</a:t>
-            </a:r>
-            <a:r>
-              <a:rPr lang="en-US" altLang="ja-JP" sz="1600" dirty="0">
-                <a:latin typeface="Consolas" panose="020B0609020204030204" pitchFamily="49" charset="0"/>
-                <a:cs typeface="Consolas" panose="020B0609020204030204" pitchFamily="49" charset="0"/>
-              </a:rPr>
-              <a:t>(@"Wikipedia\Resources\UserAgentMapping.xml");</a:t>
-            </a:r>
-          </a:p>
-          <a:p>
-            <a:endParaRPr lang="en-US" altLang="ja-JP" sz="1600" dirty="0">
-              <a:latin typeface="Consolas" panose="020B0609020204030204" pitchFamily="49" charset="0"/>
-              <a:cs typeface="Consolas" panose="020B0609020204030204" pitchFamily="49" charset="0"/>
-            </a:endParaRPr>
-          </a:p>
-          <a:p>
-            <a:r>
-              <a:rPr lang="en-US" altLang="ja-JP" sz="1600" dirty="0">
-                <a:latin typeface="Consolas" panose="020B0609020204030204" pitchFamily="49" charset="0"/>
-                <a:cs typeface="Consolas" panose="020B0609020204030204" pitchFamily="49" charset="0"/>
-              </a:rPr>
-              <a:t>    // Act</a:t>
-            </a:r>
-          </a:p>
-          <a:p>
-            <a:r>
-              <a:rPr lang="en-US" altLang="ja-JP" sz="1600" dirty="0">
-                <a:latin typeface="Consolas" panose="020B0609020204030204" pitchFamily="49" charset="0"/>
-                <a:cs typeface="Consolas" panose="020B0609020204030204" pitchFamily="49" charset="0"/>
-              </a:rPr>
-              <a:t>    </a:t>
-            </a:r>
-            <a:r>
-              <a:rPr lang="en-US" altLang="ja-JP" sz="1600" dirty="0" err="1">
-                <a:latin typeface="Consolas" panose="020B0609020204030204" pitchFamily="49" charset="0"/>
-                <a:cs typeface="Consolas" panose="020B0609020204030204" pitchFamily="49" charset="0"/>
-              </a:rPr>
-              <a:t>var</a:t>
-            </a:r>
-            <a:r>
-              <a:rPr lang="en-US" altLang="ja-JP" sz="1600" dirty="0">
-                <a:latin typeface="Consolas" panose="020B0609020204030204" pitchFamily="49" charset="0"/>
-                <a:cs typeface="Consolas" panose="020B0609020204030204" pitchFamily="49" charset="0"/>
-              </a:rPr>
-              <a:t> result = await </a:t>
-            </a:r>
-            <a:r>
-              <a:rPr lang="en-US" altLang="ja-JP" sz="1600" dirty="0" err="1">
-                <a:latin typeface="Consolas" panose="020B0609020204030204" pitchFamily="49" charset="0"/>
-                <a:cs typeface="Consolas" panose="020B0609020204030204" pitchFamily="49" charset="0"/>
-              </a:rPr>
-              <a:t>TestExecutor.Test</a:t>
-            </a:r>
-            <a:r>
-              <a:rPr lang="en-US" altLang="ja-JP" sz="1600" dirty="0">
-                <a:latin typeface="Consolas" panose="020B0609020204030204" pitchFamily="49" charset="0"/>
-                <a:cs typeface="Consolas" panose="020B0609020204030204" pitchFamily="49" charset="0"/>
-              </a:rPr>
-              <a:t>(</a:t>
-            </a:r>
-            <a:r>
-              <a:rPr lang="en-US" altLang="ja-JP" sz="1600" dirty="0" err="1">
-                <a:latin typeface="Consolas" panose="020B0609020204030204" pitchFamily="49" charset="0"/>
-                <a:cs typeface="Consolas" panose="020B0609020204030204" pitchFamily="49" charset="0"/>
-              </a:rPr>
-              <a:t>testCasesCsv</a:t>
-            </a:r>
-            <a:r>
-              <a:rPr lang="en-US" altLang="ja-JP" sz="1600" dirty="0">
-                <a:latin typeface="Consolas" panose="020B0609020204030204" pitchFamily="49" charset="0"/>
-                <a:cs typeface="Consolas" panose="020B0609020204030204" pitchFamily="49" charset="0"/>
-              </a:rPr>
-              <a:t>, </a:t>
-            </a:r>
-            <a:r>
-              <a:rPr lang="en-US" altLang="ja-JP" sz="1600" dirty="0" err="1">
-                <a:latin typeface="Consolas" panose="020B0609020204030204" pitchFamily="49" charset="0"/>
-                <a:cs typeface="Consolas" panose="020B0609020204030204" pitchFamily="49" charset="0"/>
-              </a:rPr>
-              <a:t>baseUriMappingXml</a:t>
-            </a:r>
-            <a:r>
-              <a:rPr lang="en-US" altLang="ja-JP" sz="1600" dirty="0">
-                <a:latin typeface="Consolas" panose="020B0609020204030204" pitchFamily="49" charset="0"/>
-                <a:cs typeface="Consolas" panose="020B0609020204030204" pitchFamily="49" charset="0"/>
-              </a:rPr>
-              <a:t>, </a:t>
-            </a:r>
-            <a:r>
-              <a:rPr lang="en-US" altLang="ja-JP" sz="1600" dirty="0" err="1">
-                <a:latin typeface="Consolas" panose="020B0609020204030204" pitchFamily="49" charset="0"/>
-                <a:cs typeface="Consolas" panose="020B0609020204030204" pitchFamily="49" charset="0"/>
-              </a:rPr>
-              <a:t>userAgentMappingXml</a:t>
-            </a:r>
-            <a:r>
-              <a:rPr lang="en-US" altLang="ja-JP" sz="1600" dirty="0">
-                <a:latin typeface="Consolas" panose="020B0609020204030204" pitchFamily="49" charset="0"/>
-                <a:cs typeface="Consolas" panose="020B0609020204030204" pitchFamily="49" charset="0"/>
-              </a:rPr>
-              <a:t>);</a:t>
-            </a:r>
-          </a:p>
-          <a:p>
-            <a:endParaRPr lang="en-US" altLang="ja-JP" sz="1600" dirty="0">
-              <a:latin typeface="Consolas" panose="020B0609020204030204" pitchFamily="49" charset="0"/>
-              <a:cs typeface="Consolas" panose="020B0609020204030204" pitchFamily="49" charset="0"/>
-            </a:endParaRPr>
-          </a:p>
-          <a:p>
-            <a:r>
-              <a:rPr lang="en-US" altLang="ja-JP" sz="1600" dirty="0">
-                <a:latin typeface="Consolas" panose="020B0609020204030204" pitchFamily="49" charset="0"/>
-                <a:cs typeface="Consolas" panose="020B0609020204030204" pitchFamily="49" charset="0"/>
-              </a:rPr>
-              <a:t>    // Assert</a:t>
-            </a:r>
-          </a:p>
-          <a:p>
-            <a:r>
-              <a:rPr lang="en-US" altLang="ja-JP" sz="1600" dirty="0">
-                <a:latin typeface="Consolas" panose="020B0609020204030204" pitchFamily="49" charset="0"/>
-                <a:cs typeface="Consolas" panose="020B0609020204030204" pitchFamily="49" charset="0"/>
-              </a:rPr>
-              <a:t>    if (!</a:t>
-            </a:r>
-            <a:r>
-              <a:rPr lang="en-US" altLang="ja-JP" sz="1600" dirty="0" err="1">
-                <a:latin typeface="Consolas" panose="020B0609020204030204" pitchFamily="49" charset="0"/>
-                <a:cs typeface="Consolas" panose="020B0609020204030204" pitchFamily="49" charset="0"/>
-              </a:rPr>
-              <a:t>string.IsNullOrWhiteSpace</a:t>
-            </a:r>
-            <a:r>
-              <a:rPr lang="en-US" altLang="ja-JP" sz="1600" dirty="0">
-                <a:latin typeface="Consolas" panose="020B0609020204030204" pitchFamily="49" charset="0"/>
-                <a:cs typeface="Consolas" panose="020B0609020204030204" pitchFamily="49" charset="0"/>
-              </a:rPr>
-              <a:t>(</a:t>
-            </a:r>
-            <a:r>
-              <a:rPr lang="en-US" altLang="ja-JP" sz="1600" dirty="0" err="1">
-                <a:latin typeface="Consolas" panose="020B0609020204030204" pitchFamily="49" charset="0"/>
-                <a:cs typeface="Consolas" panose="020B0609020204030204" pitchFamily="49" charset="0"/>
-              </a:rPr>
-              <a:t>result.FailedMessage</a:t>
-            </a:r>
-            <a:r>
-              <a:rPr lang="en-US" altLang="ja-JP" sz="1600" dirty="0">
-                <a:latin typeface="Consolas" panose="020B0609020204030204" pitchFamily="49" charset="0"/>
-                <a:cs typeface="Consolas" panose="020B0609020204030204" pitchFamily="49" charset="0"/>
-              </a:rPr>
-              <a:t>))</a:t>
-            </a:r>
-          </a:p>
-          <a:p>
-            <a:r>
-              <a:rPr lang="en-US" altLang="ja-JP" sz="1600" dirty="0">
-                <a:latin typeface="Consolas" panose="020B0609020204030204" pitchFamily="49" charset="0"/>
-                <a:cs typeface="Consolas" panose="020B0609020204030204" pitchFamily="49" charset="0"/>
-              </a:rPr>
-              <a:t>    {</a:t>
-            </a:r>
-          </a:p>
-          <a:p>
-            <a:r>
-              <a:rPr lang="en-US" altLang="ja-JP" sz="1600" dirty="0">
-                <a:latin typeface="Consolas" panose="020B0609020204030204" pitchFamily="49" charset="0"/>
-                <a:cs typeface="Consolas" panose="020B0609020204030204" pitchFamily="49" charset="0"/>
-              </a:rPr>
-              <a:t>        </a:t>
-            </a:r>
-            <a:r>
-              <a:rPr lang="en-US" altLang="ja-JP" sz="1600" dirty="0" err="1">
-                <a:latin typeface="Consolas" panose="020B0609020204030204" pitchFamily="49" charset="0"/>
-                <a:cs typeface="Consolas" panose="020B0609020204030204" pitchFamily="49" charset="0"/>
-              </a:rPr>
-              <a:t>Assert.Fail</a:t>
-            </a:r>
-            <a:r>
-              <a:rPr lang="en-US" altLang="ja-JP" sz="1600" dirty="0">
-                <a:latin typeface="Consolas" panose="020B0609020204030204" pitchFamily="49" charset="0"/>
-                <a:cs typeface="Consolas" panose="020B0609020204030204" pitchFamily="49" charset="0"/>
-              </a:rPr>
-              <a:t>(</a:t>
-            </a:r>
-            <a:r>
-              <a:rPr lang="en-US" altLang="ja-JP" sz="1600" dirty="0" err="1">
-                <a:latin typeface="Consolas" panose="020B0609020204030204" pitchFamily="49" charset="0"/>
-                <a:cs typeface="Consolas" panose="020B0609020204030204" pitchFamily="49" charset="0"/>
-              </a:rPr>
-              <a:t>result.FailedMessage</a:t>
-            </a:r>
-            <a:r>
-              <a:rPr lang="en-US" altLang="ja-JP" sz="1600" dirty="0">
-                <a:latin typeface="Consolas" panose="020B0609020204030204" pitchFamily="49" charset="0"/>
-                <a:cs typeface="Consolas" panose="020B0609020204030204" pitchFamily="49" charset="0"/>
-              </a:rPr>
-              <a:t>);</a:t>
-            </a:r>
-          </a:p>
-          <a:p>
-            <a:r>
-              <a:rPr lang="en-US" altLang="ja-JP" sz="1600" dirty="0">
-                <a:latin typeface="Consolas" panose="020B0609020204030204" pitchFamily="49" charset="0"/>
-                <a:cs typeface="Consolas" panose="020B0609020204030204" pitchFamily="49" charset="0"/>
-              </a:rPr>
-              <a:t>    }</a:t>
-            </a:r>
-          </a:p>
-          <a:p>
-            <a:r>
-              <a:rPr lang="en-US" altLang="ja-JP" sz="1600" dirty="0">
-                <a:latin typeface="Consolas" panose="020B0609020204030204" pitchFamily="49" charset="0"/>
-                <a:cs typeface="Consolas" panose="020B0609020204030204" pitchFamily="49" charset="0"/>
-              </a:rPr>
-              <a:t>}</a:t>
-            </a:r>
-            <a:endParaRPr kumimoji="1" lang="ja-JP" altLang="en-US" sz="1600" dirty="0">
-              <a:latin typeface="Consolas" panose="020B0609020204030204" pitchFamily="49" charset="0"/>
-              <a:cs typeface="Consolas" panose="020B0609020204030204" pitchFamily="49" charset="0"/>
-            </a:endParaRPr>
+            <a:pPr algn="ctr"/>
+            <a:r>
+              <a:rPr kumimoji="1" lang="en-US" altLang="ja-JP" sz="1200" dirty="0" smtClean="0"/>
+              <a:t>1. Get actual </a:t>
+            </a:r>
+            <a:r>
+              <a:rPr lang="en-US" altLang="ja-JP" sz="1200" dirty="0" smtClean="0"/>
+              <a:t>d</a:t>
+            </a:r>
+            <a:r>
+              <a:rPr kumimoji="1" lang="en-US" altLang="ja-JP" sz="1200" dirty="0" smtClean="0"/>
+              <a:t>ocument</a:t>
+            </a:r>
+            <a:endParaRPr kumimoji="1" lang="ja-JP" altLang="en-US" sz="1200" dirty="0"/>
+          </a:p>
+        </p:txBody>
+      </p:sp>
+      <p:cxnSp>
+        <p:nvCxnSpPr>
+          <p:cNvPr id="12" name="Straight Arrow Connector 11"/>
+          <p:cNvCxnSpPr/>
+          <p:nvPr/>
+        </p:nvCxnSpPr>
+        <p:spPr>
+          <a:xfrm flipH="1">
+            <a:off x="4862202" y="4858132"/>
+            <a:ext cx="2377440" cy="0"/>
+          </a:xfrm>
+          <a:prstGeom prst="straightConnector1">
+            <a:avLst/>
+          </a:prstGeom>
+          <a:ln>
+            <a:tailEnd type="triangle"/>
+          </a:ln>
+        </p:spPr>
+        <p:style>
+          <a:lnRef idx="2">
+            <a:schemeClr val="dk1"/>
+          </a:lnRef>
+          <a:fillRef idx="0">
+            <a:schemeClr val="dk1"/>
+          </a:fillRef>
+          <a:effectRef idx="1">
+            <a:schemeClr val="dk1"/>
+          </a:effectRef>
+          <a:fontRef idx="minor">
+            <a:schemeClr val="tx1"/>
+          </a:fontRef>
+        </p:style>
+      </p:cxnSp>
+      <p:sp>
+        <p:nvSpPr>
+          <p:cNvPr id="15" name="TextBox 14"/>
+          <p:cNvSpPr txBox="1"/>
+          <p:nvPr/>
+        </p:nvSpPr>
+        <p:spPr>
+          <a:xfrm>
+            <a:off x="4396707" y="5292495"/>
+            <a:ext cx="2301916" cy="461665"/>
+          </a:xfrm>
+          <a:prstGeom prst="rect">
+            <a:avLst/>
+          </a:prstGeom>
+          <a:noFill/>
+        </p:spPr>
+        <p:txBody>
+          <a:bodyPr wrap="square" rtlCol="0">
+            <a:spAutoFit/>
+          </a:bodyPr>
+          <a:lstStyle/>
+          <a:p>
+            <a:pPr algn="ctr"/>
+            <a:r>
+              <a:rPr lang="en-US" altLang="ja-JP" sz="1200" dirty="0"/>
+              <a:t>2</a:t>
+            </a:r>
+            <a:r>
+              <a:rPr kumimoji="1" lang="en-US" altLang="ja-JP" sz="1200" dirty="0" smtClean="0"/>
+              <a:t>. Assert </a:t>
+            </a:r>
+            <a:r>
+              <a:rPr kumimoji="1" lang="en-US" altLang="ja-JP" sz="1200" dirty="0" smtClean="0"/>
+              <a:t>Header </a:t>
+            </a:r>
+            <a:r>
+              <a:rPr kumimoji="1" lang="en-US" altLang="ja-JP" sz="1200" dirty="0" smtClean="0"/>
+              <a:t>values and/or </a:t>
+            </a:r>
+            <a:r>
+              <a:rPr kumimoji="1" lang="en-US" altLang="ja-JP" sz="1200" dirty="0" smtClean="0"/>
+              <a:t>JSON </a:t>
+            </a:r>
+            <a:r>
+              <a:rPr kumimoji="1" lang="en-US" altLang="ja-JP" sz="1200" dirty="0" smtClean="0"/>
+              <a:t>values</a:t>
+            </a:r>
+            <a:endParaRPr kumimoji="1" lang="ja-JP" altLang="en-US" sz="1200" dirty="0"/>
+          </a:p>
+        </p:txBody>
+      </p:sp>
+      <p:sp>
+        <p:nvSpPr>
+          <p:cNvPr id="16" name="Flowchart: Punched Tape 15"/>
+          <p:cNvSpPr/>
+          <p:nvPr/>
+        </p:nvSpPr>
+        <p:spPr>
+          <a:xfrm>
+            <a:off x="2847165" y="4631176"/>
+            <a:ext cx="623943" cy="435685"/>
+          </a:xfrm>
+          <a:prstGeom prst="flowChartPunchedTape">
+            <a:avLst/>
+          </a:prstGeom>
+        </p:spPr>
+        <p:style>
+          <a:lnRef idx="2">
+            <a:schemeClr val="accent6">
+              <a:shade val="50000"/>
+            </a:schemeClr>
+          </a:lnRef>
+          <a:fillRef idx="1">
+            <a:schemeClr val="accent6"/>
+          </a:fillRef>
+          <a:effectRef idx="0">
+            <a:schemeClr val="accent6"/>
+          </a:effectRef>
+          <a:fontRef idx="minor">
+            <a:schemeClr val="lt1"/>
+          </a:fontRef>
+        </p:style>
+        <p:txBody>
+          <a:bodyPr rtlCol="0" anchor="ctr"/>
+          <a:lstStyle/>
+          <a:p>
+            <a:pPr algn="ctr"/>
+            <a:r>
+              <a:rPr kumimoji="1" lang="en-US" altLang="ja-JP" sz="1200" dirty="0" smtClean="0"/>
+              <a:t>CSV</a:t>
+            </a:r>
+            <a:endParaRPr kumimoji="1" lang="ja-JP" altLang="en-US" sz="1200" dirty="0"/>
+          </a:p>
+        </p:txBody>
+      </p:sp>
+      <p:sp>
+        <p:nvSpPr>
+          <p:cNvPr id="18" name="Flowchart: Punched Tape 17"/>
+          <p:cNvSpPr/>
+          <p:nvPr/>
+        </p:nvSpPr>
+        <p:spPr>
+          <a:xfrm>
+            <a:off x="5058081" y="4657467"/>
+            <a:ext cx="623943" cy="435685"/>
+          </a:xfrm>
+          <a:prstGeom prst="flowChartPunchedTape">
+            <a:avLst/>
+          </a:prstGeom>
+        </p:spPr>
+        <p:style>
+          <a:lnRef idx="2">
+            <a:schemeClr val="accent2">
+              <a:shade val="50000"/>
+            </a:schemeClr>
+          </a:lnRef>
+          <a:fillRef idx="1">
+            <a:schemeClr val="accent2"/>
+          </a:fillRef>
+          <a:effectRef idx="0">
+            <a:schemeClr val="accent2"/>
+          </a:effectRef>
+          <a:fontRef idx="minor">
+            <a:schemeClr val="lt1"/>
+          </a:fontRef>
+        </p:style>
+        <p:txBody>
+          <a:bodyPr rtlCol="0" anchor="ctr"/>
+          <a:lstStyle/>
+          <a:p>
+            <a:pPr algn="ctr"/>
+            <a:r>
+              <a:rPr lang="en-US" altLang="ja-JP" sz="1200" dirty="0" smtClean="0"/>
+              <a:t>JSON/XML</a:t>
+            </a:r>
+            <a:endParaRPr kumimoji="1" lang="ja-JP" altLang="en-US" sz="1200" dirty="0"/>
+          </a:p>
+        </p:txBody>
+      </p:sp>
+      <p:sp>
+        <p:nvSpPr>
+          <p:cNvPr id="19" name="TextBox 18"/>
+          <p:cNvSpPr txBox="1"/>
+          <p:nvPr/>
+        </p:nvSpPr>
+        <p:spPr>
+          <a:xfrm>
+            <a:off x="2569360" y="5319933"/>
+            <a:ext cx="1274562" cy="276999"/>
+          </a:xfrm>
+          <a:prstGeom prst="rect">
+            <a:avLst/>
+          </a:prstGeom>
+          <a:noFill/>
+        </p:spPr>
+        <p:txBody>
+          <a:bodyPr wrap="square" rtlCol="0">
+            <a:spAutoFit/>
+          </a:bodyPr>
+          <a:lstStyle/>
+          <a:p>
+            <a:r>
+              <a:rPr lang="en-US" altLang="ja-JP" sz="1200" dirty="0" smtClean="0"/>
+              <a:t>Expected Values</a:t>
+            </a:r>
+            <a:endParaRPr kumimoji="1" lang="ja-JP" altLang="en-US" sz="1200" dirty="0"/>
+          </a:p>
+        </p:txBody>
+      </p:sp>
+      <p:sp>
+        <p:nvSpPr>
+          <p:cNvPr id="20" name="Up Arrow 19"/>
+          <p:cNvSpPr/>
+          <p:nvPr/>
+        </p:nvSpPr>
+        <p:spPr>
+          <a:xfrm>
+            <a:off x="3041023" y="4981778"/>
+            <a:ext cx="250114" cy="359754"/>
+          </a:xfrm>
+          <a:prstGeom prst="upArrow">
+            <a:avLst/>
+          </a:prstGeom>
+        </p:spPr>
+        <p:style>
+          <a:lnRef idx="2">
+            <a:schemeClr val="dk1"/>
+          </a:lnRef>
+          <a:fillRef idx="1">
+            <a:schemeClr val="lt1"/>
+          </a:fillRef>
+          <a:effectRef idx="0">
+            <a:schemeClr val="dk1"/>
+          </a:effectRef>
+          <a:fontRef idx="minor">
+            <a:schemeClr val="dk1"/>
+          </a:fontRef>
+        </p:style>
+        <p:txBody>
+          <a:bodyPr rtlCol="0" anchor="ctr"/>
+          <a:lstStyle/>
+          <a:p>
+            <a:pPr algn="ctr"/>
+            <a:endParaRPr kumimoji="1" lang="ja-JP" altLang="en-US"/>
           </a:p>
         </p:txBody>
       </p:sp>
     </p:spTree>
     <p:extLst>
       <p:ext uri="{BB962C8B-B14F-4D97-AF65-F5344CB8AC3E}">
-        <p14:creationId xmlns:p14="http://schemas.microsoft.com/office/powerpoint/2010/main" val="3722264324"/>
+        <p14:creationId xmlns:p14="http://schemas.microsoft.com/office/powerpoint/2010/main" val="2829013561"/>
       </p:ext>
     </p:extLst>
   </p:cSld>
@@ -15464,36 +15362,496 @@
         </p:nvSpPr>
         <p:spPr/>
         <p:txBody>
-          <a:bodyPr/>
+          <a:bodyPr>
+            <a:normAutofit/>
+          </a:bodyPr>
           <a:lstStyle/>
           <a:p>
-            <a:endParaRPr lang="en-US"/>
+            <a:r>
+              <a:rPr kumimoji="1" lang="en-US" altLang="ja-JP" dirty="0" smtClean="0"/>
+              <a:t>Sample Implementation</a:t>
+            </a:r>
+            <a:endParaRPr kumimoji="1" lang="ja-JP" altLang="en-US" dirty="0"/>
           </a:p>
         </p:txBody>
       </p:sp>
       <p:sp>
         <p:nvSpPr>
-          <p:cNvPr id="3" name="Content Placeholder 2"/>
-          <p:cNvSpPr>
-            <a:spLocks noGrp="1"/>
-          </p:cNvSpPr>
-          <p:nvPr>
-            <p:ph idx="1"/>
-          </p:nvPr>
+          <p:cNvPr id="4" name="TextBox 3"/>
+          <p:cNvSpPr txBox="1"/>
+          <p:nvPr/>
         </p:nvSpPr>
-        <p:spPr/>
+        <p:spPr>
+          <a:xfrm>
+            <a:off x="247934" y="1949996"/>
+            <a:ext cx="11696131" cy="4278094"/>
+          </a:xfrm>
+          <a:prstGeom prst="rect">
+            <a:avLst/>
+          </a:prstGeom>
+          <a:noFill/>
+          <a:ln>
+            <a:solidFill>
+              <a:schemeClr val="tx1"/>
+            </a:solidFill>
+          </a:ln>
+        </p:spPr>
         <p:txBody>
-          <a:bodyPr/>
+          <a:bodyPr wrap="square" rtlCol="0">
+            <a:spAutoFit/>
+          </a:bodyPr>
           <a:lstStyle/>
           <a:p>
-            <a:endParaRPr lang="en-US"/>
+            <a:r>
+              <a:rPr lang="en-US" altLang="ja-JP" sz="1600" dirty="0">
+                <a:latin typeface="Consolas" panose="020B0609020204030204" pitchFamily="49" charset="0"/>
+                <a:cs typeface="Consolas" panose="020B0609020204030204" pitchFamily="49" charset="0"/>
+              </a:rPr>
+              <a:t>[</a:t>
+            </a:r>
+            <a:r>
+              <a:rPr lang="en-US" altLang="ja-JP" sz="1600" dirty="0" err="1">
+                <a:latin typeface="Consolas" panose="020B0609020204030204" pitchFamily="49" charset="0"/>
+                <a:cs typeface="Consolas" panose="020B0609020204030204" pitchFamily="49" charset="0"/>
+              </a:rPr>
+              <a:t>TestMethod</a:t>
+            </a:r>
+            <a:r>
+              <a:rPr lang="en-US" altLang="ja-JP" sz="1600" dirty="0">
+                <a:latin typeface="Consolas" panose="020B0609020204030204" pitchFamily="49" charset="0"/>
+                <a:cs typeface="Consolas" panose="020B0609020204030204" pitchFamily="49" charset="0"/>
+              </a:rPr>
+              <a:t>]</a:t>
+            </a:r>
+          </a:p>
+          <a:p>
+            <a:r>
+              <a:rPr lang="en-US" altLang="ja-JP" sz="1600" dirty="0">
+                <a:latin typeface="Consolas" panose="020B0609020204030204" pitchFamily="49" charset="0"/>
+                <a:cs typeface="Consolas" panose="020B0609020204030204" pitchFamily="49" charset="0"/>
+              </a:rPr>
+              <a:t>public </a:t>
+            </a:r>
+            <a:r>
+              <a:rPr lang="en-US" altLang="ja-JP" sz="1600" dirty="0" err="1">
+                <a:latin typeface="Consolas" panose="020B0609020204030204" pitchFamily="49" charset="0"/>
+                <a:cs typeface="Consolas" panose="020B0609020204030204" pitchFamily="49" charset="0"/>
+              </a:rPr>
+              <a:t>async</a:t>
+            </a:r>
+            <a:r>
+              <a:rPr lang="en-US" altLang="ja-JP" sz="1600" dirty="0">
+                <a:latin typeface="Consolas" panose="020B0609020204030204" pitchFamily="49" charset="0"/>
+                <a:cs typeface="Consolas" panose="020B0609020204030204" pitchFamily="49" charset="0"/>
+              </a:rPr>
+              <a:t> Task </a:t>
+            </a:r>
+            <a:r>
+              <a:rPr lang="en-US" altLang="ja-JP" sz="1600" dirty="0" err="1">
+                <a:latin typeface="Consolas" panose="020B0609020204030204" pitchFamily="49" charset="0"/>
+                <a:cs typeface="Consolas" panose="020B0609020204030204" pitchFamily="49" charset="0"/>
+              </a:rPr>
+              <a:t>TestWikipediaWithUnitedStatesPage</a:t>
+            </a:r>
+            <a:r>
+              <a:rPr lang="en-US" altLang="ja-JP" sz="1600" dirty="0">
+                <a:latin typeface="Consolas" panose="020B0609020204030204" pitchFamily="49" charset="0"/>
+                <a:cs typeface="Consolas" panose="020B0609020204030204" pitchFamily="49" charset="0"/>
+              </a:rPr>
+              <a:t>()</a:t>
+            </a:r>
+          </a:p>
+          <a:p>
+            <a:r>
+              <a:rPr lang="en-US" altLang="ja-JP" sz="1600" dirty="0">
+                <a:latin typeface="Consolas" panose="020B0609020204030204" pitchFamily="49" charset="0"/>
+                <a:cs typeface="Consolas" panose="020B0609020204030204" pitchFamily="49" charset="0"/>
+              </a:rPr>
+              <a:t>{</a:t>
+            </a:r>
+          </a:p>
+          <a:p>
+            <a:r>
+              <a:rPr lang="en-US" altLang="ja-JP" sz="1600" dirty="0">
+                <a:latin typeface="Consolas" panose="020B0609020204030204" pitchFamily="49" charset="0"/>
+                <a:cs typeface="Consolas" panose="020B0609020204030204" pitchFamily="49" charset="0"/>
+              </a:rPr>
+              <a:t>    // Arrange</a:t>
+            </a:r>
+          </a:p>
+          <a:p>
+            <a:r>
+              <a:rPr lang="en-US" altLang="ja-JP" sz="1600" dirty="0">
+                <a:latin typeface="Consolas" panose="020B0609020204030204" pitchFamily="49" charset="0"/>
+                <a:cs typeface="Consolas" panose="020B0609020204030204" pitchFamily="49" charset="0"/>
+              </a:rPr>
+              <a:t>    </a:t>
+            </a:r>
+            <a:r>
+              <a:rPr lang="en-US" altLang="ja-JP" sz="1600" dirty="0" err="1">
+                <a:latin typeface="Consolas" panose="020B0609020204030204" pitchFamily="49" charset="0"/>
+                <a:cs typeface="Consolas" panose="020B0609020204030204" pitchFamily="49" charset="0"/>
+              </a:rPr>
+              <a:t>var</a:t>
+            </a:r>
+            <a:r>
+              <a:rPr lang="en-US" altLang="ja-JP" sz="1600" dirty="0">
+                <a:latin typeface="Consolas" panose="020B0609020204030204" pitchFamily="49" charset="0"/>
+                <a:cs typeface="Consolas" panose="020B0609020204030204" pitchFamily="49" charset="0"/>
+              </a:rPr>
+              <a:t> </a:t>
+            </a:r>
+            <a:r>
+              <a:rPr lang="en-US" altLang="ja-JP" sz="1600" dirty="0" err="1">
+                <a:latin typeface="Consolas" panose="020B0609020204030204" pitchFamily="49" charset="0"/>
+                <a:cs typeface="Consolas" panose="020B0609020204030204" pitchFamily="49" charset="0"/>
+              </a:rPr>
+              <a:t>testCasesCsv</a:t>
+            </a:r>
+            <a:r>
+              <a:rPr lang="en-US" altLang="ja-JP" sz="1600" dirty="0">
+                <a:latin typeface="Consolas" panose="020B0609020204030204" pitchFamily="49" charset="0"/>
+                <a:cs typeface="Consolas" panose="020B0609020204030204" pitchFamily="49" charset="0"/>
+              </a:rPr>
+              <a:t> = </a:t>
+            </a:r>
+            <a:r>
+              <a:rPr lang="en-US" altLang="ja-JP" sz="1600" dirty="0" err="1">
+                <a:latin typeface="Consolas" panose="020B0609020204030204" pitchFamily="49" charset="0"/>
+                <a:cs typeface="Consolas" panose="020B0609020204030204" pitchFamily="49" charset="0"/>
+              </a:rPr>
+              <a:t>File.ReadAllText</a:t>
+            </a:r>
+            <a:r>
+              <a:rPr lang="en-US" altLang="ja-JP" sz="1600" dirty="0">
+                <a:latin typeface="Consolas" panose="020B0609020204030204" pitchFamily="49" charset="0"/>
+                <a:cs typeface="Consolas" panose="020B0609020204030204" pitchFamily="49" charset="0"/>
+              </a:rPr>
+              <a:t>(@"Wikipedia\Resources\Test_United_States.csv");</a:t>
+            </a:r>
+          </a:p>
+          <a:p>
+            <a:r>
+              <a:rPr lang="en-US" altLang="ja-JP" sz="1600" dirty="0">
+                <a:latin typeface="Consolas" panose="020B0609020204030204" pitchFamily="49" charset="0"/>
+                <a:cs typeface="Consolas" panose="020B0609020204030204" pitchFamily="49" charset="0"/>
+              </a:rPr>
+              <a:t>    </a:t>
+            </a:r>
+            <a:r>
+              <a:rPr lang="en-US" altLang="ja-JP" sz="1600" dirty="0" err="1">
+                <a:latin typeface="Consolas" panose="020B0609020204030204" pitchFamily="49" charset="0"/>
+                <a:cs typeface="Consolas" panose="020B0609020204030204" pitchFamily="49" charset="0"/>
+              </a:rPr>
+              <a:t>var</a:t>
+            </a:r>
+            <a:r>
+              <a:rPr lang="en-US" altLang="ja-JP" sz="1600" dirty="0">
+                <a:latin typeface="Consolas" panose="020B0609020204030204" pitchFamily="49" charset="0"/>
+                <a:cs typeface="Consolas" panose="020B0609020204030204" pitchFamily="49" charset="0"/>
+              </a:rPr>
+              <a:t> </a:t>
+            </a:r>
+            <a:r>
+              <a:rPr lang="en-US" altLang="ja-JP" sz="1600" dirty="0" err="1">
+                <a:latin typeface="Consolas" panose="020B0609020204030204" pitchFamily="49" charset="0"/>
+                <a:cs typeface="Consolas" panose="020B0609020204030204" pitchFamily="49" charset="0"/>
+              </a:rPr>
+              <a:t>baseUriMappingXml</a:t>
+            </a:r>
+            <a:r>
+              <a:rPr lang="en-US" altLang="ja-JP" sz="1600" dirty="0">
+                <a:latin typeface="Consolas" panose="020B0609020204030204" pitchFamily="49" charset="0"/>
+                <a:cs typeface="Consolas" panose="020B0609020204030204" pitchFamily="49" charset="0"/>
+              </a:rPr>
+              <a:t> = </a:t>
+            </a:r>
+            <a:r>
+              <a:rPr lang="en-US" altLang="ja-JP" sz="1600" dirty="0" err="1">
+                <a:latin typeface="Consolas" panose="020B0609020204030204" pitchFamily="49" charset="0"/>
+                <a:cs typeface="Consolas" panose="020B0609020204030204" pitchFamily="49" charset="0"/>
+              </a:rPr>
+              <a:t>File.ReadAllText</a:t>
+            </a:r>
+            <a:r>
+              <a:rPr lang="en-US" altLang="ja-JP" sz="1600" dirty="0">
+                <a:latin typeface="Consolas" panose="020B0609020204030204" pitchFamily="49" charset="0"/>
+                <a:cs typeface="Consolas" panose="020B0609020204030204" pitchFamily="49" charset="0"/>
+              </a:rPr>
+              <a:t>(@"Wikipedia\Resources\BaseUriMapping.xml");</a:t>
+            </a:r>
+          </a:p>
+          <a:p>
+            <a:r>
+              <a:rPr lang="en-US" altLang="ja-JP" sz="1600" dirty="0">
+                <a:latin typeface="Consolas" panose="020B0609020204030204" pitchFamily="49" charset="0"/>
+                <a:cs typeface="Consolas" panose="020B0609020204030204" pitchFamily="49" charset="0"/>
+              </a:rPr>
+              <a:t>    </a:t>
+            </a:r>
+            <a:r>
+              <a:rPr lang="en-US" altLang="ja-JP" sz="1600" dirty="0" err="1">
+                <a:latin typeface="Consolas" panose="020B0609020204030204" pitchFamily="49" charset="0"/>
+                <a:cs typeface="Consolas" panose="020B0609020204030204" pitchFamily="49" charset="0"/>
+              </a:rPr>
+              <a:t>var</a:t>
+            </a:r>
+            <a:r>
+              <a:rPr lang="en-US" altLang="ja-JP" sz="1600" dirty="0">
+                <a:latin typeface="Consolas" panose="020B0609020204030204" pitchFamily="49" charset="0"/>
+                <a:cs typeface="Consolas" panose="020B0609020204030204" pitchFamily="49" charset="0"/>
+              </a:rPr>
+              <a:t> </a:t>
+            </a:r>
+            <a:r>
+              <a:rPr lang="en-US" altLang="ja-JP" sz="1600" dirty="0" err="1">
+                <a:latin typeface="Consolas" panose="020B0609020204030204" pitchFamily="49" charset="0"/>
+                <a:cs typeface="Consolas" panose="020B0609020204030204" pitchFamily="49" charset="0"/>
+              </a:rPr>
+              <a:t>userAgentMappingXml</a:t>
+            </a:r>
+            <a:r>
+              <a:rPr lang="en-US" altLang="ja-JP" sz="1600" dirty="0">
+                <a:latin typeface="Consolas" panose="020B0609020204030204" pitchFamily="49" charset="0"/>
+                <a:cs typeface="Consolas" panose="020B0609020204030204" pitchFamily="49" charset="0"/>
+              </a:rPr>
+              <a:t> = </a:t>
+            </a:r>
+            <a:r>
+              <a:rPr lang="en-US" altLang="ja-JP" sz="1600" dirty="0" err="1">
+                <a:latin typeface="Consolas" panose="020B0609020204030204" pitchFamily="49" charset="0"/>
+                <a:cs typeface="Consolas" panose="020B0609020204030204" pitchFamily="49" charset="0"/>
+              </a:rPr>
+              <a:t>File.ReadAllText</a:t>
+            </a:r>
+            <a:r>
+              <a:rPr lang="en-US" altLang="ja-JP" sz="1600" dirty="0">
+                <a:latin typeface="Consolas" panose="020B0609020204030204" pitchFamily="49" charset="0"/>
+                <a:cs typeface="Consolas" panose="020B0609020204030204" pitchFamily="49" charset="0"/>
+              </a:rPr>
+              <a:t>(@"Wikipedia\Resources\UserAgentMapping.xml");</a:t>
+            </a:r>
+          </a:p>
+          <a:p>
+            <a:endParaRPr lang="en-US" altLang="ja-JP" sz="1600" dirty="0">
+              <a:latin typeface="Consolas" panose="020B0609020204030204" pitchFamily="49" charset="0"/>
+              <a:cs typeface="Consolas" panose="020B0609020204030204" pitchFamily="49" charset="0"/>
+            </a:endParaRPr>
+          </a:p>
+          <a:p>
+            <a:r>
+              <a:rPr lang="en-US" altLang="ja-JP" sz="1600" dirty="0">
+                <a:latin typeface="Consolas" panose="020B0609020204030204" pitchFamily="49" charset="0"/>
+                <a:cs typeface="Consolas" panose="020B0609020204030204" pitchFamily="49" charset="0"/>
+              </a:rPr>
+              <a:t>    // Act</a:t>
+            </a:r>
+          </a:p>
+          <a:p>
+            <a:r>
+              <a:rPr lang="en-US" altLang="ja-JP" sz="1600" dirty="0">
+                <a:latin typeface="Consolas" panose="020B0609020204030204" pitchFamily="49" charset="0"/>
+                <a:cs typeface="Consolas" panose="020B0609020204030204" pitchFamily="49" charset="0"/>
+              </a:rPr>
+              <a:t>    </a:t>
+            </a:r>
+            <a:r>
+              <a:rPr lang="en-US" altLang="ja-JP" sz="1600" dirty="0" err="1">
+                <a:latin typeface="Consolas" panose="020B0609020204030204" pitchFamily="49" charset="0"/>
+                <a:cs typeface="Consolas" panose="020B0609020204030204" pitchFamily="49" charset="0"/>
+              </a:rPr>
+              <a:t>var</a:t>
+            </a:r>
+            <a:r>
+              <a:rPr lang="en-US" altLang="ja-JP" sz="1600" dirty="0">
+                <a:latin typeface="Consolas" panose="020B0609020204030204" pitchFamily="49" charset="0"/>
+                <a:cs typeface="Consolas" panose="020B0609020204030204" pitchFamily="49" charset="0"/>
+              </a:rPr>
+              <a:t> result = await </a:t>
+            </a:r>
+            <a:r>
+              <a:rPr lang="en-US" altLang="ja-JP" sz="1600" dirty="0" err="1" smtClean="0">
+                <a:latin typeface="Consolas" panose="020B0609020204030204" pitchFamily="49" charset="0"/>
+                <a:cs typeface="Consolas" panose="020B0609020204030204" pitchFamily="49" charset="0"/>
+              </a:rPr>
+              <a:t>TestExecutor.TestAsync</a:t>
+            </a:r>
+            <a:r>
+              <a:rPr lang="en-US" altLang="ja-JP" sz="1600" dirty="0" smtClean="0">
+                <a:latin typeface="Consolas" panose="020B0609020204030204" pitchFamily="49" charset="0"/>
+                <a:cs typeface="Consolas" panose="020B0609020204030204" pitchFamily="49" charset="0"/>
+              </a:rPr>
+              <a:t>(</a:t>
+            </a:r>
+            <a:r>
+              <a:rPr lang="en-US" altLang="ja-JP" sz="1600" dirty="0" err="1" smtClean="0">
+                <a:latin typeface="Consolas" panose="020B0609020204030204" pitchFamily="49" charset="0"/>
+                <a:cs typeface="Consolas" panose="020B0609020204030204" pitchFamily="49" charset="0"/>
+              </a:rPr>
+              <a:t>testCasesCsv</a:t>
+            </a:r>
+            <a:r>
+              <a:rPr lang="en-US" altLang="ja-JP" sz="1600" dirty="0">
+                <a:latin typeface="Consolas" panose="020B0609020204030204" pitchFamily="49" charset="0"/>
+                <a:cs typeface="Consolas" panose="020B0609020204030204" pitchFamily="49" charset="0"/>
+              </a:rPr>
+              <a:t>, </a:t>
+            </a:r>
+            <a:r>
+              <a:rPr lang="en-US" altLang="ja-JP" sz="1600" dirty="0" err="1">
+                <a:latin typeface="Consolas" panose="020B0609020204030204" pitchFamily="49" charset="0"/>
+                <a:cs typeface="Consolas" panose="020B0609020204030204" pitchFamily="49" charset="0"/>
+              </a:rPr>
+              <a:t>baseUriMappingXml</a:t>
+            </a:r>
+            <a:r>
+              <a:rPr lang="en-US" altLang="ja-JP" sz="1600" dirty="0">
+                <a:latin typeface="Consolas" panose="020B0609020204030204" pitchFamily="49" charset="0"/>
+                <a:cs typeface="Consolas" panose="020B0609020204030204" pitchFamily="49" charset="0"/>
+              </a:rPr>
+              <a:t>, </a:t>
+            </a:r>
+            <a:r>
+              <a:rPr lang="en-US" altLang="ja-JP" sz="1600" dirty="0" err="1">
+                <a:latin typeface="Consolas" panose="020B0609020204030204" pitchFamily="49" charset="0"/>
+                <a:cs typeface="Consolas" panose="020B0609020204030204" pitchFamily="49" charset="0"/>
+              </a:rPr>
+              <a:t>userAgentMappingXml</a:t>
+            </a:r>
+            <a:r>
+              <a:rPr lang="en-US" altLang="ja-JP" sz="1600" dirty="0">
+                <a:latin typeface="Consolas" panose="020B0609020204030204" pitchFamily="49" charset="0"/>
+                <a:cs typeface="Consolas" panose="020B0609020204030204" pitchFamily="49" charset="0"/>
+              </a:rPr>
+              <a:t>);</a:t>
+            </a:r>
+          </a:p>
+          <a:p>
+            <a:endParaRPr lang="en-US" altLang="ja-JP" sz="1600" dirty="0">
+              <a:latin typeface="Consolas" panose="020B0609020204030204" pitchFamily="49" charset="0"/>
+              <a:cs typeface="Consolas" panose="020B0609020204030204" pitchFamily="49" charset="0"/>
+            </a:endParaRPr>
+          </a:p>
+          <a:p>
+            <a:r>
+              <a:rPr lang="en-US" altLang="ja-JP" sz="1600" dirty="0">
+                <a:latin typeface="Consolas" panose="020B0609020204030204" pitchFamily="49" charset="0"/>
+                <a:cs typeface="Consolas" panose="020B0609020204030204" pitchFamily="49" charset="0"/>
+              </a:rPr>
+              <a:t>    // Assert</a:t>
+            </a:r>
+          </a:p>
+          <a:p>
+            <a:r>
+              <a:rPr lang="en-US" altLang="ja-JP" sz="1600" dirty="0">
+                <a:latin typeface="Consolas" panose="020B0609020204030204" pitchFamily="49" charset="0"/>
+                <a:cs typeface="Consolas" panose="020B0609020204030204" pitchFamily="49" charset="0"/>
+              </a:rPr>
+              <a:t>    if (!</a:t>
+            </a:r>
+            <a:r>
+              <a:rPr lang="en-US" altLang="ja-JP" sz="1600" dirty="0" err="1">
+                <a:latin typeface="Consolas" panose="020B0609020204030204" pitchFamily="49" charset="0"/>
+                <a:cs typeface="Consolas" panose="020B0609020204030204" pitchFamily="49" charset="0"/>
+              </a:rPr>
+              <a:t>string.IsNullOrWhiteSpace</a:t>
+            </a:r>
+            <a:r>
+              <a:rPr lang="en-US" altLang="ja-JP" sz="1600" dirty="0">
+                <a:latin typeface="Consolas" panose="020B0609020204030204" pitchFamily="49" charset="0"/>
+                <a:cs typeface="Consolas" panose="020B0609020204030204" pitchFamily="49" charset="0"/>
+              </a:rPr>
+              <a:t>(</a:t>
+            </a:r>
+            <a:r>
+              <a:rPr lang="en-US" altLang="ja-JP" sz="1600" dirty="0" err="1">
+                <a:latin typeface="Consolas" panose="020B0609020204030204" pitchFamily="49" charset="0"/>
+                <a:cs typeface="Consolas" panose="020B0609020204030204" pitchFamily="49" charset="0"/>
+              </a:rPr>
+              <a:t>result.FailedMessage</a:t>
+            </a:r>
+            <a:r>
+              <a:rPr lang="en-US" altLang="ja-JP" sz="1600" dirty="0">
+                <a:latin typeface="Consolas" panose="020B0609020204030204" pitchFamily="49" charset="0"/>
+                <a:cs typeface="Consolas" panose="020B0609020204030204" pitchFamily="49" charset="0"/>
+              </a:rPr>
+              <a:t>))</a:t>
+            </a:r>
+          </a:p>
+          <a:p>
+            <a:r>
+              <a:rPr lang="en-US" altLang="ja-JP" sz="1600" dirty="0">
+                <a:latin typeface="Consolas" panose="020B0609020204030204" pitchFamily="49" charset="0"/>
+                <a:cs typeface="Consolas" panose="020B0609020204030204" pitchFamily="49" charset="0"/>
+              </a:rPr>
+              <a:t>    {</a:t>
+            </a:r>
+          </a:p>
+          <a:p>
+            <a:r>
+              <a:rPr lang="en-US" altLang="ja-JP" sz="1600" dirty="0">
+                <a:latin typeface="Consolas" panose="020B0609020204030204" pitchFamily="49" charset="0"/>
+                <a:cs typeface="Consolas" panose="020B0609020204030204" pitchFamily="49" charset="0"/>
+              </a:rPr>
+              <a:t>        </a:t>
+            </a:r>
+            <a:r>
+              <a:rPr lang="en-US" altLang="ja-JP" sz="1600" dirty="0" err="1">
+                <a:latin typeface="Consolas" panose="020B0609020204030204" pitchFamily="49" charset="0"/>
+                <a:cs typeface="Consolas" panose="020B0609020204030204" pitchFamily="49" charset="0"/>
+              </a:rPr>
+              <a:t>Assert.Fail</a:t>
+            </a:r>
+            <a:r>
+              <a:rPr lang="en-US" altLang="ja-JP" sz="1600" dirty="0">
+                <a:latin typeface="Consolas" panose="020B0609020204030204" pitchFamily="49" charset="0"/>
+                <a:cs typeface="Consolas" panose="020B0609020204030204" pitchFamily="49" charset="0"/>
+              </a:rPr>
+              <a:t>(</a:t>
+            </a:r>
+            <a:r>
+              <a:rPr lang="en-US" altLang="ja-JP" sz="1600" dirty="0" err="1">
+                <a:latin typeface="Consolas" panose="020B0609020204030204" pitchFamily="49" charset="0"/>
+                <a:cs typeface="Consolas" panose="020B0609020204030204" pitchFamily="49" charset="0"/>
+              </a:rPr>
+              <a:t>result.FailedMessage</a:t>
+            </a:r>
+            <a:r>
+              <a:rPr lang="en-US" altLang="ja-JP" sz="1600" dirty="0">
+                <a:latin typeface="Consolas" panose="020B0609020204030204" pitchFamily="49" charset="0"/>
+                <a:cs typeface="Consolas" panose="020B0609020204030204" pitchFamily="49" charset="0"/>
+              </a:rPr>
+              <a:t>);</a:t>
+            </a:r>
+          </a:p>
+          <a:p>
+            <a:r>
+              <a:rPr lang="en-US" altLang="ja-JP" sz="1600" dirty="0">
+                <a:latin typeface="Consolas" panose="020B0609020204030204" pitchFamily="49" charset="0"/>
+                <a:cs typeface="Consolas" panose="020B0609020204030204" pitchFamily="49" charset="0"/>
+              </a:rPr>
+              <a:t>    }</a:t>
+            </a:r>
+          </a:p>
+          <a:p>
+            <a:r>
+              <a:rPr lang="en-US" altLang="ja-JP" sz="1600" dirty="0">
+                <a:latin typeface="Consolas" panose="020B0609020204030204" pitchFamily="49" charset="0"/>
+                <a:cs typeface="Consolas" panose="020B0609020204030204" pitchFamily="49" charset="0"/>
+              </a:rPr>
+              <a:t>}</a:t>
+            </a:r>
+            <a:endParaRPr kumimoji="1" lang="ja-JP" altLang="en-US" sz="1600" dirty="0">
+              <a:latin typeface="Consolas" panose="020B0609020204030204" pitchFamily="49" charset="0"/>
+              <a:cs typeface="Consolas" panose="020B0609020204030204" pitchFamily="49" charset="0"/>
+            </a:endParaRPr>
           </a:p>
         </p:txBody>
       </p:sp>
     </p:spTree>
     <p:extLst>
       <p:ext uri="{BB962C8B-B14F-4D97-AF65-F5344CB8AC3E}">
-        <p14:creationId xmlns:p14="http://schemas.microsoft.com/office/powerpoint/2010/main" val="1797180077"/>
+        <p14:creationId xmlns:p14="http://schemas.microsoft.com/office/powerpoint/2010/main" val="3722264324"/>
       </p:ext>
     </p:extLst>
   </p:cSld>
@@ -15605,21 +15963,21 @@
               <a:t> result = await </a:t>
             </a:r>
             <a:r>
-              <a:rPr lang="en-US" altLang="ja-JP" sz="1100" dirty="0" err="1">
+              <a:rPr lang="en-US" altLang="ja-JP" sz="1100" dirty="0" err="1" smtClean="0">
                 <a:latin typeface="Consolas" panose="020B0609020204030204" pitchFamily="49" charset="0"/>
                 <a:cs typeface="Consolas" panose="020B0609020204030204" pitchFamily="49" charset="0"/>
               </a:rPr>
-              <a:t>TestExecutor.Test</a:t>
-            </a:r>
-            <a:r>
-              <a:rPr lang="en-US" altLang="ja-JP" sz="1100" dirty="0">
+              <a:t>TestExecutor.TestAsync</a:t>
+            </a:r>
+            <a:r>
+              <a:rPr lang="en-US" altLang="ja-JP" sz="1100" dirty="0" smtClean="0">
                 <a:latin typeface="Consolas" panose="020B0609020204030204" pitchFamily="49" charset="0"/>
                 <a:cs typeface="Consolas" panose="020B0609020204030204" pitchFamily="49" charset="0"/>
               </a:rPr>
               <a:t>(</a:t>
             </a:r>
             <a:r>
-              <a:rPr lang="en-US" altLang="ja-JP" sz="1100" dirty="0" err="1">
+              <a:rPr lang="en-US" altLang="ja-JP" sz="1100" dirty="0" err="1" smtClean="0">
                 <a:latin typeface="Consolas" panose="020B0609020204030204" pitchFamily="49" charset="0"/>
                 <a:cs typeface="Consolas" panose="020B0609020204030204" pitchFamily="49" charset="0"/>
               </a:rPr>
@@ -16411,21 +16769,6 @@
 </file>
 
 <file path=customXml/item1.xml><?xml version="1.0" encoding="utf-8"?>
-<p:properties xmlns:p="http://schemas.microsoft.com/office/2006/metadata/properties" xmlns:xsi="http://www.w3.org/2001/XMLSchema-instance" xmlns:pc="http://schemas.microsoft.com/office/infopath/2007/PartnerControls">
-  <documentManagement/>
-</p:properties>
-</file>
-
-<file path=customXml/item2.xml><?xml version="1.0" encoding="utf-8"?>
-<?mso-contentType ?>
-<FormTemplates xmlns="http://schemas.microsoft.com/sharepoint/v3/contenttype/forms">
-  <Display>DocumentLibraryForm</Display>
-  <Edit>DocumentLibraryForm</Edit>
-  <New>DocumentLibraryForm</New>
-</FormTemplates>
-</file>
-
-<file path=customXml/item3.xml><?xml version="1.0" encoding="utf-8"?>
 <ct:contentTypeSchema xmlns:ct="http://schemas.microsoft.com/office/2006/metadata/contentType" xmlns:ma="http://schemas.microsoft.com/office/2006/metadata/properties/metaAttributes" ct:_="" ma:_="" ma:contentTypeName="Document" ma:contentTypeID="0x0101001B968C0B8F28E94A90F10CCE3692BEAE" ma:contentTypeVersion="0" ma:contentTypeDescription="Create a new document." ma:contentTypeScope="" ma:versionID="58e0b16a9fa654af356476d2c4c5277b">
   <xsd:schema xmlns:xsd="http://www.w3.org/2001/XMLSchema" xmlns:xs="http://www.w3.org/2001/XMLSchema" xmlns:p="http://schemas.microsoft.com/office/2006/metadata/properties" targetNamespace="http://schemas.microsoft.com/office/2006/metadata/properties" ma:root="true" ma:fieldsID="55d4e5e7253be25b7889d13b6e87b8fb">
     <xsd:element name="properties">
@@ -16539,17 +16882,33 @@
 </ct:contentTypeSchema>
 </file>
 
+<file path=customXml/item2.xml><?xml version="1.0" encoding="utf-8"?>
+<?mso-contentType ?>
+<FormTemplates xmlns="http://schemas.microsoft.com/sharepoint/v3/contenttype/forms">
+  <Display>DocumentLibraryForm</Display>
+  <Edit>DocumentLibraryForm</Edit>
+  <New>DocumentLibraryForm</New>
+</FormTemplates>
+</file>
+
+<file path=customXml/item3.xml><?xml version="1.0" encoding="utf-8"?>
+<p:properties xmlns:p="http://schemas.microsoft.com/office/2006/metadata/properties" xmlns:xsi="http://www.w3.org/2001/XMLSchema-instance" xmlns:pc="http://schemas.microsoft.com/office/infopath/2007/PartnerControls">
+  <documentManagement/>
+</p:properties>
+</file>
+
 <file path=customXml/itemProps1.xml><?xml version="1.0" encoding="utf-8"?>
-<ds:datastoreItem xmlns:ds="http://schemas.openxmlformats.org/officeDocument/2006/customXml" ds:itemID="{CBDA727C-FAD9-4FBC-8E18-93FC651893EE}">
+<ds:datastoreItem xmlns:ds="http://schemas.openxmlformats.org/officeDocument/2006/customXml" ds:itemID="{40252174-93F1-466D-AB72-63B9D1A22DE1}">
   <ds:schemaRefs>
+    <ds:schemaRef ds:uri="http://schemas.microsoft.com/office/2006/metadata/contentType"/>
+    <ds:schemaRef ds:uri="http://schemas.microsoft.com/office/2006/metadata/properties/metaAttributes"/>
+    <ds:schemaRef ds:uri="http://www.w3.org/2001/XMLSchema"/>
     <ds:schemaRef ds:uri="http://schemas.microsoft.com/office/2006/metadata/properties"/>
+    <ds:schemaRef ds:uri="http://schemas.openxmlformats.org/package/2006/metadata/core-properties"/>
+    <ds:schemaRef ds:uri="http://purl.org/dc/elements/1.1/"/>
     <ds:schemaRef ds:uri="http://purl.org/dc/terms/"/>
-    <ds:schemaRef ds:uri="http://schemas.openxmlformats.org/package/2006/metadata/core-properties"/>
-    <ds:schemaRef ds:uri="http://purl.org/dc/dcmitype/"/>
+    <ds:schemaRef ds:uri="http://schemas.microsoft.com/internal/obd"/>
     <ds:schemaRef ds:uri="http://schemas.microsoft.com/office/infopath/2007/PartnerControls"/>
-    <ds:schemaRef ds:uri="http://schemas.microsoft.com/office/2006/documentManagement/types"/>
-    <ds:schemaRef ds:uri="http://purl.org/dc/elements/1.1/"/>
-    <ds:schemaRef ds:uri="http://www.w3.org/XML/1998/namespace"/>
   </ds:schemaRefs>
 </ds:datastoreItem>
 </file>
@@ -16563,17 +16922,16 @@
 </file>
 
 <file path=customXml/itemProps3.xml><?xml version="1.0" encoding="utf-8"?>
-<ds:datastoreItem xmlns:ds="http://schemas.openxmlformats.org/officeDocument/2006/customXml" ds:itemID="{40252174-93F1-466D-AB72-63B9D1A22DE1}">
+<ds:datastoreItem xmlns:ds="http://schemas.openxmlformats.org/officeDocument/2006/customXml" ds:itemID="{CBDA727C-FAD9-4FBC-8E18-93FC651893EE}">
   <ds:schemaRefs>
-    <ds:schemaRef ds:uri="http://schemas.microsoft.com/office/2006/metadata/contentType"/>
-    <ds:schemaRef ds:uri="http://schemas.microsoft.com/office/2006/metadata/properties/metaAttributes"/>
-    <ds:schemaRef ds:uri="http://www.w3.org/2001/XMLSchema"/>
     <ds:schemaRef ds:uri="http://schemas.microsoft.com/office/2006/metadata/properties"/>
+    <ds:schemaRef ds:uri="http://purl.org/dc/terms/"/>
     <ds:schemaRef ds:uri="http://schemas.openxmlformats.org/package/2006/metadata/core-properties"/>
+    <ds:schemaRef ds:uri="http://purl.org/dc/dcmitype/"/>
+    <ds:schemaRef ds:uri="http://schemas.microsoft.com/office/infopath/2007/PartnerControls"/>
+    <ds:schemaRef ds:uri="http://schemas.microsoft.com/office/2006/documentManagement/types"/>
     <ds:schemaRef ds:uri="http://purl.org/dc/elements/1.1/"/>
-    <ds:schemaRef ds:uri="http://purl.org/dc/terms/"/>
-    <ds:schemaRef ds:uri="http://schemas.microsoft.com/internal/obd"/>
-    <ds:schemaRef ds:uri="http://schemas.microsoft.com/office/infopath/2007/PartnerControls"/>
+    <ds:schemaRef ds:uri="http://www.w3.org/XML/1998/namespace"/>
   </ds:schemaRefs>
 </ds:datastoreItem>
 </file>
</xml_diff>